<commit_message>
corrected and added some parts to the design
</commit_message>
<xml_diff>
--- a/System.pptx
+++ b/System.pptx
@@ -106,6 +106,11 @@
       </a:defRPr>
     </a:lvl9pPr>
   </p:defaultTextStyle>
+  <p:extLst>
+    <p:ext uri="{EFAFB233-063F-42B5-8137-9DF3F51BA10A}">
+      <p15:sldGuideLst xmlns:p15="http://schemas.microsoft.com/office/powerpoint/2012/main"/>
+    </p:ext>
+  </p:extLst>
 </p:presentation>
 </file>
 
@@ -3429,92 +3434,807 @@
           <a:chExt cx="0" cy="0"/>
         </a:xfrm>
       </p:grpSpPr>
-      <p:sp>
-        <p:nvSpPr>
-          <p:cNvPr id="2" name="Titel 1">
-            <a:extLst>
-              <a:ext uri="{FF2B5EF4-FFF2-40B4-BE49-F238E27FC236}">
-                <a16:creationId xmlns:a16="http://schemas.microsoft.com/office/drawing/2014/main" id="{65F39ED9-C01A-43D8-87B4-D5B9E7348D41}"/>
-              </a:ext>
-            </a:extLst>
-          </p:cNvPr>
-          <p:cNvSpPr>
-            <a:spLocks noGrp="1"/>
-          </p:cNvSpPr>
-          <p:nvPr>
-            <p:ph type="title"/>
-          </p:nvPr>
-        </p:nvSpPr>
-        <p:spPr/>
-        <p:txBody>
-          <a:bodyPr/>
-          <a:lstStyle/>
-          <a:p>
-            <a:endParaRPr lang="en-US"/>
-          </a:p>
-        </p:txBody>
-      </p:sp>
-      <p:sp>
-        <p:nvSpPr>
-          <p:cNvPr id="3" name="Inhaltsplatzhalter 2">
-            <a:extLst>
-              <a:ext uri="{FF2B5EF4-FFF2-40B4-BE49-F238E27FC236}">
-                <a16:creationId xmlns:a16="http://schemas.microsoft.com/office/drawing/2014/main" id="{CC7874CF-29B7-4129-AF34-F83412C9CE9B}"/>
-              </a:ext>
-            </a:extLst>
-          </p:cNvPr>
-          <p:cNvSpPr>
-            <a:spLocks noGrp="1"/>
-          </p:cNvSpPr>
-          <p:nvPr>
-            <p:ph idx="1"/>
-          </p:nvPr>
-        </p:nvSpPr>
-        <p:spPr/>
-        <p:txBody>
-          <a:bodyPr/>
-          <a:lstStyle/>
-          <a:p>
-            <a:endParaRPr lang="en-US"/>
-          </a:p>
-        </p:txBody>
-      </p:sp>
-    </p:spTree>
-    <p:extLst>
-      <p:ext uri="{BB962C8B-B14F-4D97-AF65-F5344CB8AC3E}">
-        <p14:creationId xmlns:p14="http://schemas.microsoft.com/office/powerpoint/2010/main" val="48252780"/>
-      </p:ext>
-    </p:extLst>
-  </p:cSld>
-  <p:clrMapOvr>
-    <a:masterClrMapping/>
-  </p:clrMapOvr>
-</p:sld>
-</file>
-
-<file path=ppt/slides/slide3.xml><?xml version="1.0" encoding="utf-8"?>
-<p:sld xmlns:a="http://schemas.openxmlformats.org/drawingml/2006/main" xmlns:r="http://schemas.openxmlformats.org/officeDocument/2006/relationships" xmlns:p="http://schemas.openxmlformats.org/presentationml/2006/main">
-  <p:cSld>
-    <p:spTree>
-      <p:nvGrpSpPr>
-        <p:cNvPr id="1" name=""/>
-        <p:cNvGrpSpPr/>
-        <p:nvPr/>
-      </p:nvGrpSpPr>
-      <p:grpSpPr>
-        <a:xfrm>
-          <a:off x="0" y="0"/>
-          <a:ext cx="0" cy="0"/>
-          <a:chOff x="0" y="0"/>
-          <a:chExt cx="0" cy="0"/>
-        </a:xfrm>
-      </p:grpSpPr>
-      <p:sp>
-        <p:nvSpPr>
-          <p:cNvPr id="8" name="Rectangle 6">
-            <a:extLst>
-              <a:ext uri="{FF2B5EF4-FFF2-40B4-BE49-F238E27FC236}">
-                <a16:creationId xmlns:a16="http://schemas.microsoft.com/office/drawing/2014/main" id="{2ACB7C8A-0FA3-42E6-A688-D02C1E45D693}"/>
+      <p:grpSp>
+        <p:nvGrpSpPr>
+          <p:cNvPr id="15" name="Gruppieren 14">
+            <a:extLst>
+              <a:ext uri="{FF2B5EF4-FFF2-40B4-BE49-F238E27FC236}">
+                <a16:creationId xmlns:a16="http://schemas.microsoft.com/office/drawing/2014/main" id="{B55191C8-F119-4455-AE1C-03AB4937B07D}"/>
+              </a:ext>
+            </a:extLst>
+          </p:cNvPr>
+          <p:cNvGrpSpPr/>
+          <p:nvPr/>
+        </p:nvGrpSpPr>
+        <p:grpSpPr>
+          <a:xfrm>
+            <a:off x="4893717" y="1988607"/>
+            <a:ext cx="2981340" cy="2374927"/>
+            <a:chOff x="4470385" y="1362074"/>
+            <a:chExt cx="2981340" cy="2374927"/>
+          </a:xfrm>
+        </p:grpSpPr>
+        <p:sp>
+          <p:nvSpPr>
+            <p:cNvPr id="4" name="Rectangle 1">
+              <a:extLst>
+                <a:ext uri="{FF2B5EF4-FFF2-40B4-BE49-F238E27FC236}">
+                  <a16:creationId xmlns:a16="http://schemas.microsoft.com/office/drawing/2014/main" id="{7AB54258-4505-45A2-8A3E-1319F3342068}"/>
+                </a:ext>
+              </a:extLst>
+            </p:cNvPr>
+            <p:cNvSpPr>
+              <a:spLocks noChangeArrowheads="1"/>
+            </p:cNvSpPr>
+            <p:nvPr/>
+          </p:nvSpPr>
+          <p:spPr bwMode="auto">
+            <a:xfrm>
+              <a:off x="4470400" y="1362074"/>
+              <a:ext cx="2981325" cy="266700"/>
+            </a:xfrm>
+            <a:prstGeom prst="rect">
+              <a:avLst/>
+            </a:prstGeom>
+            <a:solidFill>
+              <a:srgbClr val="4472C4"/>
+            </a:solidFill>
+            <a:ln w="12700">
+              <a:solidFill>
+                <a:srgbClr val="1F3763"/>
+              </a:solidFill>
+              <a:miter lim="800000"/>
+              <a:headEnd/>
+              <a:tailEnd/>
+            </a:ln>
+          </p:spPr>
+          <p:txBody>
+            <a:bodyPr vert="horz" wrap="square" lIns="91440" tIns="45720" rIns="91440" bIns="45720" numCol="1" anchor="ctr" anchorCtr="0" compatLnSpc="1">
+              <a:prstTxWarp prst="textNoShape">
+                <a:avLst/>
+              </a:prstTxWarp>
+            </a:bodyPr>
+            <a:lstStyle/>
+            <a:p>
+              <a:pPr marL="0" marR="0" lvl="0" indent="0" algn="ctr" defTabSz="914400" rtl="0" eaLnBrk="0" fontAlgn="base" latinLnBrk="0" hangingPunct="0">
+                <a:lnSpc>
+                  <a:spcPct val="100000"/>
+                </a:lnSpc>
+                <a:spcBef>
+                  <a:spcPct val="0"/>
+                </a:spcBef>
+                <a:spcAft>
+                  <a:spcPct val="0"/>
+                </a:spcAft>
+                <a:buClrTx/>
+                <a:buSzTx/>
+                <a:buFontTx/>
+                <a:buNone/>
+                <a:tabLst/>
+              </a:pPr>
+              <a:r>
+                <a:rPr kumimoji="0" lang="en-IE" altLang="en-US" sz="1100" b="0" i="0" u="none" strike="noStrike" cap="none" normalizeH="0" baseline="0">
+                  <a:ln>
+                    <a:noFill/>
+                  </a:ln>
+                  <a:solidFill>
+                    <a:schemeClr val="tx1"/>
+                  </a:solidFill>
+                  <a:effectLst/>
+                  <a:latin typeface="Calibri" panose="020F0502020204030204" pitchFamily="34" charset="0"/>
+                  <a:ea typeface="Calibri" panose="020F0502020204030204" pitchFamily="34" charset="0"/>
+                  <a:cs typeface="Times New Roman" panose="02020603050405020304" pitchFamily="18" charset="0"/>
+                </a:rPr>
+                <a:t>Final User </a:t>
+              </a:r>
+              <a:endParaRPr kumimoji="0" lang="en-IE" altLang="en-US" sz="1800" b="0" i="0" u="none" strike="noStrike" cap="none" normalizeH="0" baseline="0">
+                <a:ln>
+                  <a:noFill/>
+                </a:ln>
+                <a:solidFill>
+                  <a:schemeClr val="tx1"/>
+                </a:solidFill>
+                <a:effectLst/>
+                <a:latin typeface="Arial" panose="020B0604020202020204" pitchFamily="34" charset="0"/>
+              </a:endParaRPr>
+            </a:p>
+          </p:txBody>
+        </p:sp>
+        <p:sp>
+          <p:nvSpPr>
+            <p:cNvPr id="5" name="Rectangle 3">
+              <a:extLst>
+                <a:ext uri="{FF2B5EF4-FFF2-40B4-BE49-F238E27FC236}">
+                  <a16:creationId xmlns:a16="http://schemas.microsoft.com/office/drawing/2014/main" id="{8E1DCA6C-B630-42FD-B1F4-5EB77A3173DE}"/>
+                </a:ext>
+              </a:extLst>
+            </p:cNvPr>
+            <p:cNvSpPr>
+              <a:spLocks noChangeArrowheads="1"/>
+            </p:cNvSpPr>
+            <p:nvPr/>
+          </p:nvSpPr>
+          <p:spPr bwMode="auto">
+            <a:xfrm>
+              <a:off x="4470400" y="1628775"/>
+              <a:ext cx="2981325" cy="266700"/>
+            </a:xfrm>
+            <a:prstGeom prst="rect">
+              <a:avLst/>
+            </a:prstGeom>
+            <a:solidFill>
+              <a:srgbClr val="4472C4"/>
+            </a:solidFill>
+            <a:ln w="12700">
+              <a:solidFill>
+                <a:srgbClr val="1F3763"/>
+              </a:solidFill>
+              <a:miter lim="800000"/>
+              <a:headEnd/>
+              <a:tailEnd/>
+            </a:ln>
+          </p:spPr>
+          <p:txBody>
+            <a:bodyPr vert="horz" wrap="square" lIns="91440" tIns="45720" rIns="91440" bIns="45720" numCol="1" anchor="ctr" anchorCtr="0" compatLnSpc="1">
+              <a:prstTxWarp prst="textNoShape">
+                <a:avLst/>
+              </a:prstTxWarp>
+            </a:bodyPr>
+            <a:lstStyle/>
+            <a:p>
+              <a:pPr marL="0" marR="0" lvl="0" indent="0" algn="ctr" defTabSz="914400" rtl="0" eaLnBrk="0" fontAlgn="base" latinLnBrk="0" hangingPunct="0">
+                <a:lnSpc>
+                  <a:spcPct val="100000"/>
+                </a:lnSpc>
+                <a:spcBef>
+                  <a:spcPct val="0"/>
+                </a:spcBef>
+                <a:spcAft>
+                  <a:spcPct val="0"/>
+                </a:spcAft>
+                <a:buClrTx/>
+                <a:buSzTx/>
+                <a:buFontTx/>
+                <a:buNone/>
+                <a:tabLst/>
+              </a:pPr>
+              <a:r>
+                <a:rPr kumimoji="0" lang="en-IE" altLang="en-US" sz="1100" b="0" i="0" u="none" strike="noStrike" cap="none" normalizeH="0" baseline="0">
+                  <a:ln>
+                    <a:noFill/>
+                  </a:ln>
+                  <a:solidFill>
+                    <a:schemeClr val="tx1"/>
+                  </a:solidFill>
+                  <a:effectLst/>
+                  <a:latin typeface="Calibri" panose="020F0502020204030204" pitchFamily="34" charset="0"/>
+                  <a:ea typeface="Calibri" panose="020F0502020204030204" pitchFamily="34" charset="0"/>
+                  <a:cs typeface="Times New Roman" panose="02020603050405020304" pitchFamily="18" charset="0"/>
+                </a:rPr>
+                <a:t>Input </a:t>
+              </a:r>
+              <a:endParaRPr kumimoji="0" lang="en-IE" altLang="en-US" sz="1800" b="0" i="0" u="none" strike="noStrike" cap="none" normalizeH="0" baseline="0">
+                <a:ln>
+                  <a:noFill/>
+                </a:ln>
+                <a:solidFill>
+                  <a:schemeClr val="tx1"/>
+                </a:solidFill>
+                <a:effectLst/>
+                <a:latin typeface="Arial" panose="020B0604020202020204" pitchFamily="34" charset="0"/>
+              </a:endParaRPr>
+            </a:p>
+          </p:txBody>
+        </p:sp>
+        <p:sp>
+          <p:nvSpPr>
+            <p:cNvPr id="6" name="Rectangle 4">
+              <a:extLst>
+                <a:ext uri="{FF2B5EF4-FFF2-40B4-BE49-F238E27FC236}">
+                  <a16:creationId xmlns:a16="http://schemas.microsoft.com/office/drawing/2014/main" id="{270829A8-BF5D-44C4-B1BA-DD20D6D25EC2}"/>
+                </a:ext>
+              </a:extLst>
+            </p:cNvPr>
+            <p:cNvSpPr>
+              <a:spLocks noChangeArrowheads="1"/>
+            </p:cNvSpPr>
+            <p:nvPr/>
+          </p:nvSpPr>
+          <p:spPr bwMode="auto">
+            <a:xfrm>
+              <a:off x="4470392" y="1887232"/>
+              <a:ext cx="2981325" cy="266700"/>
+            </a:xfrm>
+            <a:prstGeom prst="rect">
+              <a:avLst/>
+            </a:prstGeom>
+            <a:solidFill>
+              <a:srgbClr val="4472C4"/>
+            </a:solidFill>
+            <a:ln w="12700">
+              <a:solidFill>
+                <a:srgbClr val="1F3763"/>
+              </a:solidFill>
+              <a:miter lim="800000"/>
+              <a:headEnd/>
+              <a:tailEnd/>
+            </a:ln>
+          </p:spPr>
+          <p:txBody>
+            <a:bodyPr vert="horz" wrap="square" lIns="91440" tIns="45720" rIns="91440" bIns="45720" numCol="1" anchor="ctr" anchorCtr="0" compatLnSpc="1">
+              <a:prstTxWarp prst="textNoShape">
+                <a:avLst/>
+              </a:prstTxWarp>
+            </a:bodyPr>
+            <a:lstStyle/>
+            <a:p>
+              <a:pPr marL="0" marR="0" lvl="0" indent="0" algn="ctr" defTabSz="914400" rtl="0" eaLnBrk="0" fontAlgn="base" latinLnBrk="0" hangingPunct="0">
+                <a:lnSpc>
+                  <a:spcPct val="100000"/>
+                </a:lnSpc>
+                <a:spcBef>
+                  <a:spcPct val="0"/>
+                </a:spcBef>
+                <a:spcAft>
+                  <a:spcPct val="0"/>
+                </a:spcAft>
+                <a:buClrTx/>
+                <a:buSzTx/>
+                <a:buFontTx/>
+                <a:buNone/>
+                <a:tabLst/>
+              </a:pPr>
+              <a:r>
+                <a:rPr kumimoji="0" lang="en-IE" altLang="en-US" sz="1100" b="0" i="0" u="none" strike="noStrike" cap="none" normalizeH="0" baseline="0">
+                  <a:ln>
+                    <a:noFill/>
+                  </a:ln>
+                  <a:solidFill>
+                    <a:schemeClr val="tx1"/>
+                  </a:solidFill>
+                  <a:effectLst/>
+                  <a:latin typeface="Calibri" panose="020F0502020204030204" pitchFamily="34" charset="0"/>
+                  <a:ea typeface="Calibri" panose="020F0502020204030204" pitchFamily="34" charset="0"/>
+                  <a:cs typeface="Times New Roman" panose="02020603050405020304" pitchFamily="18" charset="0"/>
+                </a:rPr>
+                <a:t>Operating System</a:t>
+              </a:r>
+              <a:endParaRPr kumimoji="0" lang="en-IE" altLang="en-US" sz="1800" b="0" i="0" u="none" strike="noStrike" cap="none" normalizeH="0" baseline="0">
+                <a:ln>
+                  <a:noFill/>
+                </a:ln>
+                <a:solidFill>
+                  <a:schemeClr val="tx1"/>
+                </a:solidFill>
+                <a:effectLst/>
+                <a:latin typeface="Arial" panose="020B0604020202020204" pitchFamily="34" charset="0"/>
+              </a:endParaRPr>
+            </a:p>
+          </p:txBody>
+        </p:sp>
+        <p:sp>
+          <p:nvSpPr>
+            <p:cNvPr id="7" name="Rectangle 5">
+              <a:extLst>
+                <a:ext uri="{FF2B5EF4-FFF2-40B4-BE49-F238E27FC236}">
+                  <a16:creationId xmlns:a16="http://schemas.microsoft.com/office/drawing/2014/main" id="{6D4AB888-70EE-4D1E-8BF6-DD77CE732DCA}"/>
+                </a:ext>
+              </a:extLst>
+            </p:cNvPr>
+            <p:cNvSpPr>
+              <a:spLocks noChangeArrowheads="1"/>
+            </p:cNvSpPr>
+            <p:nvPr/>
+          </p:nvSpPr>
+          <p:spPr bwMode="auto">
+            <a:xfrm>
+              <a:off x="4470390" y="2151389"/>
+              <a:ext cx="2981325" cy="266700"/>
+            </a:xfrm>
+            <a:prstGeom prst="rect">
+              <a:avLst/>
+            </a:prstGeom>
+            <a:solidFill>
+              <a:srgbClr val="4472C4"/>
+            </a:solidFill>
+            <a:ln w="12700">
+              <a:solidFill>
+                <a:srgbClr val="1F3763"/>
+              </a:solidFill>
+              <a:miter lim="800000"/>
+              <a:headEnd/>
+              <a:tailEnd/>
+            </a:ln>
+          </p:spPr>
+          <p:txBody>
+            <a:bodyPr vert="horz" wrap="square" lIns="91440" tIns="45720" rIns="91440" bIns="45720" numCol="1" anchor="ctr" anchorCtr="0" compatLnSpc="1">
+              <a:prstTxWarp prst="textNoShape">
+                <a:avLst/>
+              </a:prstTxWarp>
+            </a:bodyPr>
+            <a:lstStyle/>
+            <a:p>
+              <a:pPr marL="0" marR="0" lvl="0" indent="0" algn="ctr" defTabSz="914400" rtl="0" eaLnBrk="0" fontAlgn="base" latinLnBrk="0" hangingPunct="0">
+                <a:lnSpc>
+                  <a:spcPct val="100000"/>
+                </a:lnSpc>
+                <a:spcBef>
+                  <a:spcPct val="0"/>
+                </a:spcBef>
+                <a:spcAft>
+                  <a:spcPct val="0"/>
+                </a:spcAft>
+                <a:buClrTx/>
+                <a:buSzTx/>
+                <a:buFontTx/>
+                <a:buNone/>
+                <a:tabLst/>
+              </a:pPr>
+              <a:r>
+                <a:rPr kumimoji="0" lang="en-IE" altLang="en-US" sz="1100" b="0" i="0" u="none" strike="noStrike" cap="none" normalizeH="0" baseline="0">
+                  <a:ln>
+                    <a:noFill/>
+                  </a:ln>
+                  <a:solidFill>
+                    <a:schemeClr val="tx1"/>
+                  </a:solidFill>
+                  <a:effectLst/>
+                  <a:latin typeface="Calibri" panose="020F0502020204030204" pitchFamily="34" charset="0"/>
+                  <a:ea typeface="Calibri" panose="020F0502020204030204" pitchFamily="34" charset="0"/>
+                  <a:cs typeface="Times New Roman" panose="02020603050405020304" pitchFamily="18" charset="0"/>
+                </a:rPr>
+                <a:t>Separate inputs</a:t>
+              </a:r>
+              <a:endParaRPr kumimoji="0" lang="en-IE" altLang="en-US" sz="1800" b="0" i="0" u="none" strike="noStrike" cap="none" normalizeH="0" baseline="0">
+                <a:ln>
+                  <a:noFill/>
+                </a:ln>
+                <a:solidFill>
+                  <a:schemeClr val="tx1"/>
+                </a:solidFill>
+                <a:effectLst/>
+                <a:latin typeface="Arial" panose="020B0604020202020204" pitchFamily="34" charset="0"/>
+              </a:endParaRPr>
+            </a:p>
+          </p:txBody>
+        </p:sp>
+        <p:sp>
+          <p:nvSpPr>
+            <p:cNvPr id="8" name="Rectangle 6">
+              <a:extLst>
+                <a:ext uri="{FF2B5EF4-FFF2-40B4-BE49-F238E27FC236}">
+                  <a16:creationId xmlns:a16="http://schemas.microsoft.com/office/drawing/2014/main" id="{06163F37-DF50-4FE4-BDA9-6C97E5C2EBD1}"/>
+                </a:ext>
+              </a:extLst>
+            </p:cNvPr>
+            <p:cNvSpPr>
+              <a:spLocks noChangeArrowheads="1"/>
+            </p:cNvSpPr>
+            <p:nvPr/>
+          </p:nvSpPr>
+          <p:spPr bwMode="auto">
+            <a:xfrm>
+              <a:off x="4470390" y="2416188"/>
+              <a:ext cx="2981325" cy="266700"/>
+            </a:xfrm>
+            <a:prstGeom prst="rect">
+              <a:avLst/>
+            </a:prstGeom>
+            <a:solidFill>
+              <a:srgbClr val="4472C4"/>
+            </a:solidFill>
+            <a:ln w="12700">
+              <a:solidFill>
+                <a:srgbClr val="1F3763"/>
+              </a:solidFill>
+              <a:miter lim="800000"/>
+              <a:headEnd/>
+              <a:tailEnd/>
+            </a:ln>
+          </p:spPr>
+          <p:txBody>
+            <a:bodyPr vert="horz" wrap="square" lIns="91440" tIns="45720" rIns="91440" bIns="45720" numCol="1" anchor="ctr" anchorCtr="0" compatLnSpc="1">
+              <a:prstTxWarp prst="textNoShape">
+                <a:avLst/>
+              </a:prstTxWarp>
+            </a:bodyPr>
+            <a:lstStyle/>
+            <a:p>
+              <a:pPr marL="0" marR="0" lvl="0" indent="0" algn="ctr" defTabSz="914400" rtl="0" eaLnBrk="0" fontAlgn="base" latinLnBrk="0" hangingPunct="0">
+                <a:lnSpc>
+                  <a:spcPct val="100000"/>
+                </a:lnSpc>
+                <a:spcBef>
+                  <a:spcPct val="0"/>
+                </a:spcBef>
+                <a:spcAft>
+                  <a:spcPct val="0"/>
+                </a:spcAft>
+                <a:buClrTx/>
+                <a:buSzTx/>
+                <a:buFontTx/>
+                <a:buNone/>
+                <a:tabLst/>
+              </a:pPr>
+              <a:r>
+                <a:rPr kumimoji="0" lang="en-IE" altLang="en-US" sz="1100" b="0" i="0" u="none" strike="noStrike" cap="none" normalizeH="0" baseline="0">
+                  <a:ln>
+                    <a:noFill/>
+                  </a:ln>
+                  <a:solidFill>
+                    <a:schemeClr val="tx1"/>
+                  </a:solidFill>
+                  <a:effectLst/>
+                  <a:latin typeface="Calibri" panose="020F0502020204030204" pitchFamily="34" charset="0"/>
+                  <a:ea typeface="Calibri" panose="020F0502020204030204" pitchFamily="34" charset="0"/>
+                  <a:cs typeface="Times New Roman" panose="02020603050405020304" pitchFamily="18" charset="0"/>
+                </a:rPr>
+                <a:t>Write Inputs in a new file</a:t>
+              </a:r>
+              <a:endParaRPr kumimoji="0" lang="en-IE" altLang="en-US" sz="1800" b="0" i="0" u="none" strike="noStrike" cap="none" normalizeH="0" baseline="0">
+                <a:ln>
+                  <a:noFill/>
+                </a:ln>
+                <a:solidFill>
+                  <a:schemeClr val="tx1"/>
+                </a:solidFill>
+                <a:effectLst/>
+                <a:latin typeface="Arial" panose="020B0604020202020204" pitchFamily="34" charset="0"/>
+              </a:endParaRPr>
+            </a:p>
+          </p:txBody>
+        </p:sp>
+        <p:sp>
+          <p:nvSpPr>
+            <p:cNvPr id="9" name="Rectangle 7">
+              <a:extLst>
+                <a:ext uri="{FF2B5EF4-FFF2-40B4-BE49-F238E27FC236}">
+                  <a16:creationId xmlns:a16="http://schemas.microsoft.com/office/drawing/2014/main" id="{52F1A719-CB07-41D1-9FF7-FB0D8F03063A}"/>
+                </a:ext>
+              </a:extLst>
+            </p:cNvPr>
+            <p:cNvSpPr>
+              <a:spLocks noChangeArrowheads="1"/>
+            </p:cNvSpPr>
+            <p:nvPr/>
+          </p:nvSpPr>
+          <p:spPr bwMode="auto">
+            <a:xfrm>
+              <a:off x="4470389" y="2947687"/>
+              <a:ext cx="2981325" cy="266700"/>
+            </a:xfrm>
+            <a:prstGeom prst="rect">
+              <a:avLst/>
+            </a:prstGeom>
+            <a:solidFill>
+              <a:srgbClr val="4472C4"/>
+            </a:solidFill>
+            <a:ln w="12700">
+              <a:solidFill>
+                <a:srgbClr val="1F3763"/>
+              </a:solidFill>
+              <a:miter lim="800000"/>
+              <a:headEnd/>
+              <a:tailEnd/>
+            </a:ln>
+          </p:spPr>
+          <p:txBody>
+            <a:bodyPr vert="horz" wrap="square" lIns="91440" tIns="45720" rIns="91440" bIns="45720" numCol="1" anchor="ctr" anchorCtr="0" compatLnSpc="1">
+              <a:prstTxWarp prst="textNoShape">
+                <a:avLst/>
+              </a:prstTxWarp>
+            </a:bodyPr>
+            <a:lstStyle/>
+            <a:p>
+              <a:pPr marL="0" marR="0" lvl="0" indent="0" algn="ctr" defTabSz="914400" rtl="0" eaLnBrk="0" fontAlgn="base" latinLnBrk="0" hangingPunct="0">
+                <a:lnSpc>
+                  <a:spcPct val="100000"/>
+                </a:lnSpc>
+                <a:spcBef>
+                  <a:spcPct val="0"/>
+                </a:spcBef>
+                <a:spcAft>
+                  <a:spcPct val="0"/>
+                </a:spcAft>
+                <a:buClrTx/>
+                <a:buSzTx/>
+                <a:buFontTx/>
+                <a:buNone/>
+                <a:tabLst/>
+              </a:pPr>
+              <a:r>
+                <a:rPr kumimoji="0" lang="en-IE" altLang="en-US" sz="1100" b="0" i="0" u="none" strike="noStrike" cap="none" normalizeH="0" baseline="0">
+                  <a:ln>
+                    <a:noFill/>
+                  </a:ln>
+                  <a:solidFill>
+                    <a:schemeClr val="tx1"/>
+                  </a:solidFill>
+                  <a:effectLst/>
+                  <a:latin typeface="Calibri" panose="020F0502020204030204" pitchFamily="34" charset="0"/>
+                  <a:ea typeface="Calibri" panose="020F0502020204030204" pitchFamily="34" charset="0"/>
+                  <a:cs typeface="Times New Roman" panose="02020603050405020304" pitchFamily="18" charset="0"/>
+                </a:rPr>
+                <a:t>Convert the inputs to hardware instructions</a:t>
+              </a:r>
+              <a:endParaRPr kumimoji="0" lang="en-IE" altLang="en-US" sz="1800" b="0" i="0" u="none" strike="noStrike" cap="none" normalizeH="0" baseline="0">
+                <a:ln>
+                  <a:noFill/>
+                </a:ln>
+                <a:solidFill>
+                  <a:schemeClr val="tx1"/>
+                </a:solidFill>
+                <a:effectLst/>
+                <a:latin typeface="Arial" panose="020B0604020202020204" pitchFamily="34" charset="0"/>
+              </a:endParaRPr>
+            </a:p>
+          </p:txBody>
+        </p:sp>
+        <p:sp>
+          <p:nvSpPr>
+            <p:cNvPr id="10" name="Rectangle 8">
+              <a:extLst>
+                <a:ext uri="{FF2B5EF4-FFF2-40B4-BE49-F238E27FC236}">
+                  <a16:creationId xmlns:a16="http://schemas.microsoft.com/office/drawing/2014/main" id="{6D02A556-F80A-4712-B44E-DF62C74C0CB4}"/>
+                </a:ext>
+              </a:extLst>
+            </p:cNvPr>
+            <p:cNvSpPr>
+              <a:spLocks noChangeArrowheads="1"/>
+            </p:cNvSpPr>
+            <p:nvPr/>
+          </p:nvSpPr>
+          <p:spPr bwMode="auto">
+            <a:xfrm>
+              <a:off x="4470390" y="2682246"/>
+              <a:ext cx="2981325" cy="266700"/>
+            </a:xfrm>
+            <a:prstGeom prst="rect">
+              <a:avLst/>
+            </a:prstGeom>
+            <a:solidFill>
+              <a:srgbClr val="4472C4"/>
+            </a:solidFill>
+            <a:ln w="12700">
+              <a:solidFill>
+                <a:srgbClr val="1F3763"/>
+              </a:solidFill>
+              <a:miter lim="800000"/>
+              <a:headEnd/>
+              <a:tailEnd/>
+            </a:ln>
+          </p:spPr>
+          <p:txBody>
+            <a:bodyPr vert="horz" wrap="square" lIns="91440" tIns="45720" rIns="91440" bIns="45720" numCol="1" anchor="ctr" anchorCtr="0" compatLnSpc="1">
+              <a:prstTxWarp prst="textNoShape">
+                <a:avLst/>
+              </a:prstTxWarp>
+            </a:bodyPr>
+            <a:lstStyle/>
+            <a:p>
+              <a:pPr marL="0" marR="0" lvl="0" indent="0" algn="ctr" defTabSz="914400" rtl="0" eaLnBrk="0" fontAlgn="base" latinLnBrk="0" hangingPunct="0">
+                <a:lnSpc>
+                  <a:spcPct val="100000"/>
+                </a:lnSpc>
+                <a:spcBef>
+                  <a:spcPct val="0"/>
+                </a:spcBef>
+                <a:spcAft>
+                  <a:spcPct val="0"/>
+                </a:spcAft>
+                <a:buClrTx/>
+                <a:buSzTx/>
+                <a:buFontTx/>
+                <a:buNone/>
+                <a:tabLst/>
+              </a:pPr>
+              <a:r>
+                <a:rPr kumimoji="0" lang="en-IE" altLang="en-US" sz="1100" b="0" i="0" u="none" strike="noStrike" cap="none" normalizeH="0" baseline="0" dirty="0">
+                  <a:ln>
+                    <a:noFill/>
+                  </a:ln>
+                  <a:solidFill>
+                    <a:schemeClr val="tx1"/>
+                  </a:solidFill>
+                  <a:effectLst/>
+                  <a:latin typeface="Calibri" panose="020F0502020204030204" pitchFamily="34" charset="0"/>
+                  <a:ea typeface="Calibri" panose="020F0502020204030204" pitchFamily="34" charset="0"/>
+                  <a:cs typeface="Times New Roman" panose="02020603050405020304" pitchFamily="18" charset="0"/>
+                </a:rPr>
+                <a:t>Read Inputs and put it in the right order</a:t>
+              </a:r>
+              <a:endParaRPr kumimoji="0" lang="en-IE" altLang="en-US" sz="1800" b="0" i="0" u="none" strike="noStrike" cap="none" normalizeH="0" baseline="0" dirty="0">
+                <a:ln>
+                  <a:noFill/>
+                </a:ln>
+                <a:solidFill>
+                  <a:schemeClr val="tx1"/>
+                </a:solidFill>
+                <a:effectLst/>
+                <a:latin typeface="Arial" panose="020B0604020202020204" pitchFamily="34" charset="0"/>
+              </a:endParaRPr>
+            </a:p>
+          </p:txBody>
+        </p:sp>
+        <p:sp>
+          <p:nvSpPr>
+            <p:cNvPr id="11" name="Rectangle 9">
+              <a:extLst>
+                <a:ext uri="{FF2B5EF4-FFF2-40B4-BE49-F238E27FC236}">
+                  <a16:creationId xmlns:a16="http://schemas.microsoft.com/office/drawing/2014/main" id="{A2E2BC31-069A-49B6-BAEC-77FA1E57180C}"/>
+                </a:ext>
+              </a:extLst>
+            </p:cNvPr>
+            <p:cNvSpPr>
+              <a:spLocks noChangeArrowheads="1"/>
+            </p:cNvSpPr>
+            <p:nvPr/>
+          </p:nvSpPr>
+          <p:spPr bwMode="auto">
+            <a:xfrm>
+              <a:off x="4470387" y="3211844"/>
+              <a:ext cx="2981325" cy="266700"/>
+            </a:xfrm>
+            <a:prstGeom prst="rect">
+              <a:avLst/>
+            </a:prstGeom>
+            <a:solidFill>
+              <a:srgbClr val="4472C4"/>
+            </a:solidFill>
+            <a:ln w="12700">
+              <a:solidFill>
+                <a:srgbClr val="1F3763"/>
+              </a:solidFill>
+              <a:miter lim="800000"/>
+              <a:headEnd/>
+              <a:tailEnd/>
+            </a:ln>
+          </p:spPr>
+          <p:txBody>
+            <a:bodyPr vert="horz" wrap="square" lIns="91440" tIns="45720" rIns="91440" bIns="45720" numCol="1" anchor="ctr" anchorCtr="0" compatLnSpc="1">
+              <a:prstTxWarp prst="textNoShape">
+                <a:avLst/>
+              </a:prstTxWarp>
+            </a:bodyPr>
+            <a:lstStyle/>
+            <a:p>
+              <a:pPr marL="0" marR="0" lvl="0" indent="0" algn="ctr" defTabSz="914400" rtl="0" eaLnBrk="0" fontAlgn="base" latinLnBrk="0" hangingPunct="0">
+                <a:lnSpc>
+                  <a:spcPct val="100000"/>
+                </a:lnSpc>
+                <a:spcBef>
+                  <a:spcPct val="0"/>
+                </a:spcBef>
+                <a:spcAft>
+                  <a:spcPct val="0"/>
+                </a:spcAft>
+                <a:buClrTx/>
+                <a:buSzTx/>
+                <a:buFontTx/>
+                <a:buNone/>
+                <a:tabLst/>
+              </a:pPr>
+              <a:r>
+                <a:rPr kumimoji="0" lang="en-IE" altLang="en-US" sz="1100" b="0" i="0" u="none" strike="noStrike" cap="none" normalizeH="0" baseline="0" dirty="0">
+                  <a:ln>
+                    <a:noFill/>
+                  </a:ln>
+                  <a:solidFill>
+                    <a:schemeClr val="tx1"/>
+                  </a:solidFill>
+                  <a:effectLst/>
+                  <a:latin typeface="Calibri" panose="020F0502020204030204" pitchFamily="34" charset="0"/>
+                  <a:ea typeface="Calibri" panose="020F0502020204030204" pitchFamily="34" charset="0"/>
+                  <a:cs typeface="Times New Roman" panose="02020603050405020304" pitchFamily="18" charset="0"/>
+                </a:rPr>
+                <a:t>Execute hardware instructions in order(stack)</a:t>
+              </a:r>
+              <a:endParaRPr kumimoji="0" lang="en-IE" altLang="en-US" sz="1800" b="0" i="0" u="none" strike="noStrike" cap="none" normalizeH="0" baseline="0" dirty="0">
+                <a:ln>
+                  <a:noFill/>
+                </a:ln>
+                <a:solidFill>
+                  <a:schemeClr val="tx1"/>
+                </a:solidFill>
+                <a:effectLst/>
+                <a:latin typeface="Arial" panose="020B0604020202020204" pitchFamily="34" charset="0"/>
+              </a:endParaRPr>
+            </a:p>
+          </p:txBody>
+        </p:sp>
+        <p:sp>
+          <p:nvSpPr>
+            <p:cNvPr id="12" name="Rectangle 10">
+              <a:extLst>
+                <a:ext uri="{FF2B5EF4-FFF2-40B4-BE49-F238E27FC236}">
+                  <a16:creationId xmlns:a16="http://schemas.microsoft.com/office/drawing/2014/main" id="{1FA0F483-29F9-4FEA-B0A7-7852C45D68EE}"/>
+                </a:ext>
+              </a:extLst>
+            </p:cNvPr>
+            <p:cNvSpPr>
+              <a:spLocks noChangeArrowheads="1"/>
+            </p:cNvSpPr>
+            <p:nvPr/>
+          </p:nvSpPr>
+          <p:spPr bwMode="auto">
+            <a:xfrm>
+              <a:off x="4470385" y="3470301"/>
+              <a:ext cx="2981325" cy="266700"/>
+            </a:xfrm>
+            <a:prstGeom prst="rect">
+              <a:avLst/>
+            </a:prstGeom>
+            <a:solidFill>
+              <a:srgbClr val="4472C4"/>
+            </a:solidFill>
+            <a:ln w="12700">
+              <a:solidFill>
+                <a:srgbClr val="1F3763"/>
+              </a:solidFill>
+              <a:miter lim="800000"/>
+              <a:headEnd/>
+              <a:tailEnd/>
+            </a:ln>
+          </p:spPr>
+          <p:txBody>
+            <a:bodyPr vert="horz" wrap="square" lIns="91440" tIns="45720" rIns="91440" bIns="45720" numCol="1" anchor="ctr" anchorCtr="0" compatLnSpc="1">
+              <a:prstTxWarp prst="textNoShape">
+                <a:avLst/>
+              </a:prstTxWarp>
+            </a:bodyPr>
+            <a:lstStyle/>
+            <a:p>
+              <a:pPr marL="0" marR="0" lvl="0" indent="0" algn="ctr" defTabSz="914400" rtl="0" eaLnBrk="0" fontAlgn="base" latinLnBrk="0" hangingPunct="0">
+                <a:lnSpc>
+                  <a:spcPct val="100000"/>
+                </a:lnSpc>
+                <a:spcBef>
+                  <a:spcPct val="0"/>
+                </a:spcBef>
+                <a:spcAft>
+                  <a:spcPct val="0"/>
+                </a:spcAft>
+                <a:buClrTx/>
+                <a:buSzTx/>
+                <a:buFontTx/>
+                <a:buNone/>
+                <a:tabLst/>
+              </a:pPr>
+              <a:r>
+                <a:rPr kumimoji="0" lang="en-IE" altLang="en-US" sz="1100" b="0" i="0" u="none" strike="noStrike" cap="none" normalizeH="0" baseline="0">
+                  <a:ln>
+                    <a:noFill/>
+                  </a:ln>
+                  <a:solidFill>
+                    <a:schemeClr val="tx1"/>
+                  </a:solidFill>
+                  <a:effectLst/>
+                  <a:latin typeface="Calibri" panose="020F0502020204030204" pitchFamily="34" charset="0"/>
+                  <a:ea typeface="Calibri" panose="020F0502020204030204" pitchFamily="34" charset="0"/>
+                  <a:cs typeface="Times New Roman" panose="02020603050405020304" pitchFamily="18" charset="0"/>
+                </a:rPr>
+                <a:t>Save and print result</a:t>
+              </a:r>
+              <a:endParaRPr kumimoji="0" lang="en-IE" altLang="en-US" sz="1800" b="0" i="0" u="none" strike="noStrike" cap="none" normalizeH="0" baseline="0">
+                <a:ln>
+                  <a:noFill/>
+                </a:ln>
+                <a:solidFill>
+                  <a:schemeClr val="tx1"/>
+                </a:solidFill>
+                <a:effectLst/>
+                <a:latin typeface="Arial" panose="020B0604020202020204" pitchFamily="34" charset="0"/>
+              </a:endParaRPr>
+            </a:p>
+          </p:txBody>
+        </p:sp>
+      </p:grpSp>
+      <p:sp>
+        <p:nvSpPr>
+          <p:cNvPr id="13" name="Rectangle 10">
+            <a:extLst>
+              <a:ext uri="{FF2B5EF4-FFF2-40B4-BE49-F238E27FC236}">
+                <a16:creationId xmlns:a16="http://schemas.microsoft.com/office/drawing/2014/main" id="{841961C7-23A5-41D9-BC99-186CEA60BC5F}"/>
               </a:ext>
             </a:extLst>
           </p:cNvPr>
@@ -3580,6 +4300,174 @@
       </p:sp>
       <p:sp>
         <p:nvSpPr>
+          <p:cNvPr id="14" name="Rectangle 20">
+            <a:extLst>
+              <a:ext uri="{FF2B5EF4-FFF2-40B4-BE49-F238E27FC236}">
+                <a16:creationId xmlns:a16="http://schemas.microsoft.com/office/drawing/2014/main" id="{9138C5CB-DD0C-413B-A4DD-529D9F977521}"/>
+              </a:ext>
+            </a:extLst>
+          </p:cNvPr>
+          <p:cNvSpPr>
+            <a:spLocks noChangeArrowheads="1"/>
+          </p:cNvSpPr>
+          <p:nvPr/>
+        </p:nvSpPr>
+        <p:spPr bwMode="auto">
+          <a:xfrm>
+            <a:off x="203200" y="538480"/>
+            <a:ext cx="12192000" cy="0"/>
+          </a:xfrm>
+          <a:prstGeom prst="rect">
+            <a:avLst/>
+          </a:prstGeom>
+          <a:noFill/>
+          <a:ln>
+            <a:noFill/>
+          </a:ln>
+          <a:effectLst/>
+          <a:extLst>
+            <a:ext uri="{909E8E84-426E-40DD-AFC4-6F175D3DCCD1}">
+              <a14:hiddenFill xmlns:a14="http://schemas.microsoft.com/office/drawing/2010/main">
+                <a:solidFill>
+                  <a:schemeClr val="accent1"/>
+                </a:solidFill>
+              </a14:hiddenFill>
+            </a:ext>
+            <a:ext uri="{91240B29-F687-4F45-9708-019B960494DF}">
+              <a14:hiddenLine xmlns:a14="http://schemas.microsoft.com/office/drawing/2010/main" w="9525">
+                <a:solidFill>
+                  <a:schemeClr val="tx1"/>
+                </a:solidFill>
+                <a:miter lim="800000"/>
+                <a:headEnd/>
+                <a:tailEnd/>
+              </a14:hiddenLine>
+            </a:ext>
+            <a:ext uri="{AF507438-7753-43E0-B8FC-AC1667EBCBE1}">
+              <a14:hiddenEffects xmlns:a14="http://schemas.microsoft.com/office/drawing/2010/main">
+                <a:effectLst>
+                  <a:outerShdw dist="35921" dir="2700000" algn="ctr" rotWithShape="0">
+                    <a:schemeClr val="bg2"/>
+                  </a:outerShdw>
+                </a:effectLst>
+              </a14:hiddenEffects>
+            </a:ext>
+          </a:extLst>
+        </p:spPr>
+        <p:txBody>
+          <a:bodyPr vert="horz" wrap="none" lIns="91440" tIns="45720" rIns="91440" bIns="45720" numCol="1" anchor="ctr" anchorCtr="0" compatLnSpc="1">
+            <a:prstTxWarp prst="textNoShape">
+              <a:avLst/>
+            </a:prstTxWarp>
+            <a:spAutoFit/>
+          </a:bodyPr>
+          <a:lstStyle/>
+          <a:p>
+            <a:endParaRPr lang="en-US"/>
+          </a:p>
+        </p:txBody>
+      </p:sp>
+    </p:spTree>
+    <p:extLst>
+      <p:ext uri="{BB962C8B-B14F-4D97-AF65-F5344CB8AC3E}">
+        <p14:creationId xmlns:p14="http://schemas.microsoft.com/office/powerpoint/2010/main" val="48252780"/>
+      </p:ext>
+    </p:extLst>
+  </p:cSld>
+  <p:clrMapOvr>
+    <a:masterClrMapping/>
+  </p:clrMapOvr>
+</p:sld>
+</file>
+
+<file path=ppt/slides/slide3.xml><?xml version="1.0" encoding="utf-8"?>
+<p:sld xmlns:a="http://schemas.openxmlformats.org/drawingml/2006/main" xmlns:r="http://schemas.openxmlformats.org/officeDocument/2006/relationships" xmlns:p="http://schemas.openxmlformats.org/presentationml/2006/main">
+  <p:cSld>
+    <p:spTree>
+      <p:nvGrpSpPr>
+        <p:cNvPr id="1" name=""/>
+        <p:cNvGrpSpPr/>
+        <p:nvPr/>
+      </p:nvGrpSpPr>
+      <p:grpSpPr>
+        <a:xfrm>
+          <a:off x="0" y="0"/>
+          <a:ext cx="0" cy="0"/>
+          <a:chOff x="0" y="0"/>
+          <a:chExt cx="0" cy="0"/>
+        </a:xfrm>
+      </p:grpSpPr>
+      <p:sp>
+        <p:nvSpPr>
+          <p:cNvPr id="8" name="Rectangle 6">
+            <a:extLst>
+              <a:ext uri="{FF2B5EF4-FFF2-40B4-BE49-F238E27FC236}">
+                <a16:creationId xmlns:a16="http://schemas.microsoft.com/office/drawing/2014/main" id="{2ACB7C8A-0FA3-42E6-A688-D02C1E45D693}"/>
+              </a:ext>
+            </a:extLst>
+          </p:cNvPr>
+          <p:cNvSpPr>
+            <a:spLocks noChangeArrowheads="1"/>
+          </p:cNvSpPr>
+          <p:nvPr/>
+        </p:nvSpPr>
+        <p:spPr bwMode="auto">
+          <a:xfrm>
+            <a:off x="0" y="0"/>
+            <a:ext cx="12192000" cy="457200"/>
+          </a:xfrm>
+          <a:prstGeom prst="rect">
+            <a:avLst/>
+          </a:prstGeom>
+          <a:noFill/>
+          <a:ln>
+            <a:noFill/>
+          </a:ln>
+          <a:effectLst/>
+          <a:extLst>
+            <a:ext uri="{909E8E84-426E-40DD-AFC4-6F175D3DCCD1}">
+              <a14:hiddenFill xmlns:a14="http://schemas.microsoft.com/office/drawing/2010/main">
+                <a:solidFill>
+                  <a:schemeClr val="accent1"/>
+                </a:solidFill>
+              </a14:hiddenFill>
+            </a:ext>
+            <a:ext uri="{91240B29-F687-4F45-9708-019B960494DF}">
+              <a14:hiddenLine xmlns:a14="http://schemas.microsoft.com/office/drawing/2010/main" w="9525">
+                <a:solidFill>
+                  <a:schemeClr val="tx1"/>
+                </a:solidFill>
+                <a:miter lim="800000"/>
+                <a:headEnd/>
+                <a:tailEnd/>
+              </a14:hiddenLine>
+            </a:ext>
+            <a:ext uri="{AF507438-7753-43E0-B8FC-AC1667EBCBE1}">
+              <a14:hiddenEffects xmlns:a14="http://schemas.microsoft.com/office/drawing/2010/main">
+                <a:effectLst>
+                  <a:outerShdw dist="35921" dir="2700000" algn="ctr" rotWithShape="0">
+                    <a:schemeClr val="bg2"/>
+                  </a:outerShdw>
+                </a:effectLst>
+              </a14:hiddenEffects>
+            </a:ext>
+          </a:extLst>
+        </p:spPr>
+        <p:txBody>
+          <a:bodyPr vert="horz" wrap="none" lIns="91440" tIns="45720" rIns="91440" bIns="45720" numCol="1" anchor="ctr" anchorCtr="0" compatLnSpc="1">
+            <a:prstTxWarp prst="textNoShape">
+              <a:avLst/>
+            </a:prstTxWarp>
+            <a:spAutoFit/>
+          </a:bodyPr>
+          <a:lstStyle/>
+          <a:p>
+            <a:endParaRPr lang="en-US"/>
+          </a:p>
+        </p:txBody>
+      </p:sp>
+      <p:sp>
+        <p:nvSpPr>
           <p:cNvPr id="9" name="Rectangle 12">
             <a:extLst>
               <a:ext uri="{FF2B5EF4-FFF2-40B4-BE49-F238E27FC236}">
@@ -3649,10 +4537,10 @@
       </p:sp>
       <p:grpSp>
         <p:nvGrpSpPr>
-          <p:cNvPr id="19" name="Gruppieren 18">
-            <a:extLst>
-              <a:ext uri="{FF2B5EF4-FFF2-40B4-BE49-F238E27FC236}">
-                <a16:creationId xmlns:a16="http://schemas.microsoft.com/office/drawing/2014/main" id="{79C83C01-BC01-48F5-A37A-5AADEDA78563}"/>
+          <p:cNvPr id="34" name="Gruppieren 33">
+            <a:extLst>
+              <a:ext uri="{FF2B5EF4-FFF2-40B4-BE49-F238E27FC236}">
+                <a16:creationId xmlns:a16="http://schemas.microsoft.com/office/drawing/2014/main" id="{E108E9F8-9720-45A3-9049-F28E570D9B0B}"/>
               </a:ext>
             </a:extLst>
           </p:cNvPr>
@@ -3661,72 +4549,106 @@
         </p:nvGrpSpPr>
         <p:grpSpPr>
           <a:xfrm>
-            <a:off x="5046582" y="1572259"/>
-            <a:ext cx="6444378" cy="4828539"/>
-            <a:chOff x="5046582" y="1572260"/>
-            <a:chExt cx="4160838" cy="2624454"/>
+            <a:off x="2896530" y="1572259"/>
+            <a:ext cx="8594430" cy="4828539"/>
+            <a:chOff x="2896530" y="1572259"/>
+            <a:chExt cx="8594430" cy="4828539"/>
           </a:xfrm>
         </p:grpSpPr>
-        <p:sp>
-          <p:nvSpPr>
-            <p:cNvPr id="3" name="Rectángulo 3">
+        <p:grpSp>
+          <p:nvGrpSpPr>
+            <p:cNvPr id="19" name="Gruppieren 18">
               <a:extLst>
                 <a:ext uri="{FF2B5EF4-FFF2-40B4-BE49-F238E27FC236}">
-                  <a16:creationId xmlns:a16="http://schemas.microsoft.com/office/drawing/2014/main" id="{103D9074-579D-41F7-A482-9D326829849C}"/>
+                  <a16:creationId xmlns:a16="http://schemas.microsoft.com/office/drawing/2014/main" id="{79C83C01-BC01-48F5-A37A-5AADEDA78563}"/>
                 </a:ext>
               </a:extLst>
             </p:cNvPr>
-            <p:cNvSpPr>
-              <a:spLocks noChangeArrowheads="1"/>
-            </p:cNvSpPr>
+            <p:cNvGrpSpPr/>
             <p:nvPr/>
-          </p:nvSpPr>
-          <p:spPr bwMode="auto">
+          </p:nvGrpSpPr>
+          <p:grpSpPr>
             <a:xfrm>
-              <a:off x="5046582" y="1572260"/>
-              <a:ext cx="4160838" cy="2624454"/>
+              <a:off x="5046582" y="1572259"/>
+              <a:ext cx="6444378" cy="4828539"/>
+              <a:chOff x="5046582" y="1572260"/>
+              <a:chExt cx="4160838" cy="2624454"/>
             </a:xfrm>
-            <a:prstGeom prst="rect">
-              <a:avLst/>
-            </a:prstGeom>
-            <a:solidFill>
-              <a:srgbClr val="FFFFFF"/>
-            </a:solidFill>
-            <a:ln w="12700">
+          </p:grpSpPr>
+          <p:sp>
+            <p:nvSpPr>
+              <p:cNvPr id="3" name="Rectángulo 3">
+                <a:extLst>
+                  <a:ext uri="{FF2B5EF4-FFF2-40B4-BE49-F238E27FC236}">
+                    <a16:creationId xmlns:a16="http://schemas.microsoft.com/office/drawing/2014/main" id="{103D9074-579D-41F7-A482-9D326829849C}"/>
+                  </a:ext>
+                </a:extLst>
+              </p:cNvPr>
+              <p:cNvSpPr>
+                <a:spLocks noChangeArrowheads="1"/>
+              </p:cNvSpPr>
+              <p:nvPr/>
+            </p:nvSpPr>
+            <p:spPr bwMode="auto">
+              <a:xfrm>
+                <a:off x="5046582" y="1572260"/>
+                <a:ext cx="4160838" cy="2624454"/>
+              </a:xfrm>
+              <a:prstGeom prst="rect">
+                <a:avLst/>
+              </a:prstGeom>
               <a:solidFill>
-                <a:srgbClr val="70AD47"/>
+                <a:srgbClr val="FFFFFF"/>
               </a:solidFill>
-              <a:miter lim="800000"/>
-              <a:headEnd/>
-              <a:tailEnd/>
-            </a:ln>
-          </p:spPr>
-          <p:txBody>
-            <a:bodyPr vert="horz" wrap="square" lIns="91440" tIns="45720" rIns="91440" bIns="45720" numCol="1" anchor="ctr" anchorCtr="0" compatLnSpc="1">
-              <a:prstTxWarp prst="textNoShape">
-                <a:avLst/>
-              </a:prstTxWarp>
-            </a:bodyPr>
-            <a:lstStyle/>
-            <a:p>
-              <a:pPr marL="0" marR="0" lvl="0" indent="0" algn="ctr" defTabSz="914400" rtl="0" eaLnBrk="0" fontAlgn="base" latinLnBrk="0" hangingPunct="0">
-                <a:lnSpc>
-                  <a:spcPct val="100000"/>
-                </a:lnSpc>
-                <a:spcBef>
-                  <a:spcPct val="0"/>
-                </a:spcBef>
-                <a:spcAft>
-                  <a:spcPct val="0"/>
-                </a:spcAft>
-                <a:buClrTx/>
-                <a:buSzTx/>
-                <a:buFontTx/>
-                <a:buNone/>
-                <a:tabLst/>
-              </a:pPr>
-              <a:r>
-                <a:rPr kumimoji="0" lang="es-ES" altLang="en-US" sz="1800" b="0" i="0" u="none" strike="noStrike" cap="none" normalizeH="0" baseline="0" dirty="0">
+              <a:ln w="12700">
+                <a:solidFill>
+                  <a:srgbClr val="70AD47"/>
+                </a:solidFill>
+                <a:miter lim="800000"/>
+                <a:headEnd/>
+                <a:tailEnd/>
+              </a:ln>
+            </p:spPr>
+            <p:txBody>
+              <a:bodyPr vert="horz" wrap="square" lIns="91440" tIns="45720" rIns="91440" bIns="45720" numCol="1" anchor="ctr" anchorCtr="0" compatLnSpc="1">
+                <a:prstTxWarp prst="textNoShape">
+                  <a:avLst/>
+                </a:prstTxWarp>
+              </a:bodyPr>
+              <a:lstStyle/>
+              <a:p>
+                <a:pPr marL="0" marR="0" lvl="0" indent="0" algn="ctr" defTabSz="914400" rtl="0" eaLnBrk="0" fontAlgn="base" latinLnBrk="0" hangingPunct="0">
+                  <a:lnSpc>
+                    <a:spcPct val="100000"/>
+                  </a:lnSpc>
+                  <a:spcBef>
+                    <a:spcPct val="0"/>
+                  </a:spcBef>
+                  <a:spcAft>
+                    <a:spcPct val="0"/>
+                  </a:spcAft>
+                  <a:buClrTx/>
+                  <a:buSzTx/>
+                  <a:buFontTx/>
+                  <a:buNone/>
+                  <a:tabLst/>
+                </a:pPr>
+                <a:r>
+                  <a:rPr kumimoji="0" lang="es-ES" altLang="en-US" sz="1800" b="0" i="0" u="none" strike="noStrike" cap="none" normalizeH="0" baseline="0" dirty="0">
+                    <a:ln>
+                      <a:noFill/>
+                    </a:ln>
+                    <a:solidFill>
+                      <a:schemeClr val="tx1"/>
+                    </a:solidFill>
+                    <a:effectLst/>
+                    <a:latin typeface="Calibri" panose="020F0502020204030204" pitchFamily="34" charset="0"/>
+                    <a:ea typeface="Calibri" panose="020F0502020204030204" pitchFamily="34" charset="0"/>
+                    <a:cs typeface="Times New Roman" panose="02020603050405020304" pitchFamily="18" charset="0"/>
+                  </a:rPr>
+                  <a:t>Calculator System</a:t>
+                </a:r>
+                <a:endParaRPr kumimoji="0" lang="es-ES" altLang="en-US" sz="800" b="0" i="0" u="none" strike="noStrike" cap="none" normalizeH="0" baseline="0" dirty="0">
                   <a:ln>
                     <a:noFill/>
                   </a:ln>
@@ -3734,112 +4656,26 @@
                     <a:schemeClr val="tx1"/>
                   </a:solidFill>
                   <a:effectLst/>
-                  <a:latin typeface="Calibri" panose="020F0502020204030204" pitchFamily="34" charset="0"/>
-                  <a:ea typeface="Calibri" panose="020F0502020204030204" pitchFamily="34" charset="0"/>
-                  <a:cs typeface="Times New Roman" panose="02020603050405020304" pitchFamily="18" charset="0"/>
-                </a:rPr>
-                <a:t>Calculator System</a:t>
-              </a:r>
-              <a:endParaRPr kumimoji="0" lang="es-ES" altLang="en-US" sz="800" b="0" i="0" u="none" strike="noStrike" cap="none" normalizeH="0" baseline="0" dirty="0">
-                <a:ln>
-                  <a:noFill/>
-                </a:ln>
-                <a:solidFill>
-                  <a:schemeClr val="tx1"/>
-                </a:solidFill>
-                <a:effectLst/>
-              </a:endParaRPr>
-            </a:p>
-            <a:p>
-              <a:pPr marL="0" marR="0" lvl="0" indent="0" algn="l" defTabSz="914400" rtl="0" eaLnBrk="0" fontAlgn="base" latinLnBrk="0" hangingPunct="0">
-                <a:lnSpc>
-                  <a:spcPct val="100000"/>
-                </a:lnSpc>
-                <a:spcBef>
-                  <a:spcPct val="0"/>
-                </a:spcBef>
-                <a:spcAft>
-                  <a:spcPct val="0"/>
-                </a:spcAft>
-                <a:buClrTx/>
-                <a:buSzTx/>
-                <a:buFontTx/>
-                <a:buNone/>
-                <a:tabLst/>
-              </a:pPr>
-              <a:endParaRPr kumimoji="0" lang="es-ES" altLang="en-US" sz="1800" b="0" i="0" u="none" strike="noStrike" cap="none" normalizeH="0" baseline="0" dirty="0">
-                <a:ln>
-                  <a:noFill/>
-                </a:ln>
-                <a:solidFill>
-                  <a:schemeClr val="tx1"/>
-                </a:solidFill>
-                <a:effectLst/>
-                <a:latin typeface="Arial" panose="020B0604020202020204" pitchFamily="34" charset="0"/>
-              </a:endParaRPr>
-            </a:p>
-          </p:txBody>
-        </p:sp>
-        <p:sp>
-          <p:nvSpPr>
-            <p:cNvPr id="4" name="Rectángulo 11">
-              <a:extLst>
-                <a:ext uri="{FF2B5EF4-FFF2-40B4-BE49-F238E27FC236}">
-                  <a16:creationId xmlns:a16="http://schemas.microsoft.com/office/drawing/2014/main" id="{3D628885-48FA-4049-AF4D-4D31985914A2}"/>
-                </a:ext>
-              </a:extLst>
-            </p:cNvPr>
-            <p:cNvSpPr>
-              <a:spLocks noChangeArrowheads="1"/>
-            </p:cNvSpPr>
-            <p:nvPr/>
-          </p:nvSpPr>
-          <p:spPr bwMode="auto">
-            <a:xfrm>
-              <a:off x="5418137" y="1747044"/>
-              <a:ext cx="1325563" cy="800100"/>
-            </a:xfrm>
-            <a:prstGeom prst="rect">
-              <a:avLst/>
-            </a:prstGeom>
-            <a:solidFill>
-              <a:srgbClr val="4472C4"/>
-            </a:solidFill>
-            <a:ln w="12700">
-              <a:solidFill>
-                <a:srgbClr val="1F3763"/>
-              </a:solidFill>
-              <a:miter lim="800000"/>
-              <a:headEnd/>
-              <a:tailEnd/>
-            </a:ln>
-          </p:spPr>
-          <p:txBody>
-            <a:bodyPr vert="horz" wrap="square" lIns="91440" tIns="45720" rIns="91440" bIns="45720" numCol="1" anchor="ctr" anchorCtr="0" compatLnSpc="1">
-              <a:prstTxWarp prst="textNoShape">
-                <a:avLst/>
-              </a:prstTxWarp>
-            </a:bodyPr>
-            <a:lstStyle/>
-            <a:p>
-              <a:pPr marL="0" marR="0" lvl="0" indent="0" algn="ctr" defTabSz="914400" rtl="0" eaLnBrk="0" fontAlgn="base" latinLnBrk="0" hangingPunct="0">
-                <a:lnSpc>
-                  <a:spcPct val="100000"/>
-                </a:lnSpc>
-                <a:spcBef>
-                  <a:spcPct val="0"/>
-                </a:spcBef>
-                <a:spcAft>
-                  <a:spcPct val="0"/>
-                </a:spcAft>
-                <a:buClrTx/>
-                <a:buSzTx/>
-                <a:buFontTx/>
-                <a:buNone/>
-                <a:tabLst/>
-              </a:pPr>
-              <a:r>
-                <a:rPr kumimoji="0" lang="es-ES" altLang="en-US" sz="1100" b="0" i="0" u="none" strike="noStrike" cap="none" normalizeH="0" baseline="0">
+                </a:endParaRPr>
+              </a:p>
+              <a:p>
+                <a:pPr marL="0" marR="0" lvl="0" indent="0" algn="l" defTabSz="914400" rtl="0" eaLnBrk="0" fontAlgn="base" latinLnBrk="0" hangingPunct="0">
+                  <a:lnSpc>
+                    <a:spcPct val="100000"/>
+                  </a:lnSpc>
+                  <a:spcBef>
+                    <a:spcPct val="0"/>
+                  </a:spcBef>
+                  <a:spcAft>
+                    <a:spcPct val="0"/>
+                  </a:spcAft>
+                  <a:buClrTx/>
+                  <a:buSzTx/>
+                  <a:buFontTx/>
+                  <a:buNone/>
+                  <a:tabLst/>
+                </a:pPr>
+                <a:endParaRPr kumimoji="0" lang="es-ES" altLang="en-US" sz="1800" b="0" i="0" u="none" strike="noStrike" cap="none" normalizeH="0" baseline="0" dirty="0">
                   <a:ln>
                     <a:noFill/>
                   </a:ln>
@@ -3847,85 +4683,85 @@
                     <a:schemeClr val="tx1"/>
                   </a:solidFill>
                   <a:effectLst/>
-                  <a:latin typeface="Calibri" panose="020F0502020204030204" pitchFamily="34" charset="0"/>
-                  <a:ea typeface="Calibri" panose="020F0502020204030204" pitchFamily="34" charset="0"/>
-                  <a:cs typeface="Times New Roman" panose="02020603050405020304" pitchFamily="18" charset="0"/>
-                </a:rPr>
-                <a:t>Tokenizer</a:t>
-              </a:r>
-              <a:endParaRPr kumimoji="0" lang="es-ES" altLang="en-US" sz="1800" b="0" i="0" u="none" strike="noStrike" cap="none" normalizeH="0" baseline="0">
-                <a:ln>
-                  <a:noFill/>
-                </a:ln>
+                  <a:latin typeface="Arial" panose="020B0604020202020204" pitchFamily="34" charset="0"/>
+                </a:endParaRPr>
+              </a:p>
+            </p:txBody>
+          </p:sp>
+          <p:sp>
+            <p:nvSpPr>
+              <p:cNvPr id="4" name="Rectángulo 11">
+                <a:extLst>
+                  <a:ext uri="{FF2B5EF4-FFF2-40B4-BE49-F238E27FC236}">
+                    <a16:creationId xmlns:a16="http://schemas.microsoft.com/office/drawing/2014/main" id="{3D628885-48FA-4049-AF4D-4D31985914A2}"/>
+                  </a:ext>
+                </a:extLst>
+              </p:cNvPr>
+              <p:cNvSpPr>
+                <a:spLocks noChangeArrowheads="1"/>
+              </p:cNvSpPr>
+              <p:nvPr/>
+            </p:nvSpPr>
+            <p:spPr bwMode="auto">
+              <a:xfrm>
+                <a:off x="5418137" y="1747044"/>
+                <a:ext cx="1325563" cy="800100"/>
+              </a:xfrm>
+              <a:prstGeom prst="rect">
+                <a:avLst/>
+              </a:prstGeom>
+              <a:solidFill>
+                <a:srgbClr val="4472C4"/>
+              </a:solidFill>
+              <a:ln w="12700">
                 <a:solidFill>
-                  <a:schemeClr val="tx1"/>
+                  <a:srgbClr val="1F3763"/>
                 </a:solidFill>
-                <a:effectLst/>
-                <a:latin typeface="Arial" panose="020B0604020202020204" pitchFamily="34" charset="0"/>
-              </a:endParaRPr>
-            </a:p>
-          </p:txBody>
-        </p:sp>
-        <p:sp>
-          <p:nvSpPr>
-            <p:cNvPr id="5" name="Rectángulo 12">
-              <a:extLst>
-                <a:ext uri="{FF2B5EF4-FFF2-40B4-BE49-F238E27FC236}">
-                  <a16:creationId xmlns:a16="http://schemas.microsoft.com/office/drawing/2014/main" id="{F4719394-54CF-4965-8F83-2B5136B91EF5}"/>
-                </a:ext>
-              </a:extLst>
-            </p:cNvPr>
-            <p:cNvSpPr>
-              <a:spLocks noChangeArrowheads="1"/>
-            </p:cNvSpPr>
-            <p:nvPr/>
-          </p:nvSpPr>
-          <p:spPr bwMode="auto">
-            <a:xfrm>
-              <a:off x="7510303" y="1747044"/>
-              <a:ext cx="1339850" cy="800100"/>
-            </a:xfrm>
-            <a:prstGeom prst="rect">
-              <a:avLst/>
-            </a:prstGeom>
-            <a:solidFill>
-              <a:srgbClr val="4472C4"/>
-            </a:solidFill>
-            <a:ln w="12700">
-              <a:solidFill>
-                <a:srgbClr val="1F3763"/>
-              </a:solidFill>
-              <a:miter lim="800000"/>
-              <a:headEnd/>
-              <a:tailEnd/>
-            </a:ln>
-          </p:spPr>
-          <p:txBody>
-            <a:bodyPr vert="horz" wrap="square" lIns="91440" tIns="45720" rIns="91440" bIns="45720" numCol="1" anchor="ctr" anchorCtr="0" compatLnSpc="1">
-              <a:prstTxWarp prst="textNoShape">
-                <a:avLst/>
-              </a:prstTxWarp>
-            </a:bodyPr>
-            <a:lstStyle/>
-            <a:p>
-              <a:pPr marL="0" marR="0" lvl="0" indent="0" algn="ctr" defTabSz="914400" rtl="0" eaLnBrk="0" fontAlgn="base" latinLnBrk="0" hangingPunct="0">
-                <a:lnSpc>
-                  <a:spcPct val="100000"/>
-                </a:lnSpc>
-                <a:spcBef>
-                  <a:spcPct val="0"/>
-                </a:spcBef>
-                <a:spcAft>
-                  <a:spcPct val="0"/>
-                </a:spcAft>
-                <a:buClrTx/>
-                <a:buSzTx/>
-                <a:buFontTx/>
-                <a:buNone/>
-                <a:tabLst/>
-              </a:pPr>
-              <a:r>
-                <a:rPr kumimoji="0" lang="es-ES" altLang="en-US" sz="1100" b="0" i="0" u="none" strike="noStrike" cap="none" normalizeH="0" baseline="0">
+                <a:miter lim="800000"/>
+                <a:headEnd/>
+                <a:tailEnd/>
+              </a:ln>
+            </p:spPr>
+            <p:txBody>
+              <a:bodyPr vert="horz" wrap="square" lIns="91440" tIns="45720" rIns="91440" bIns="45720" numCol="1" anchor="ctr" anchorCtr="0" compatLnSpc="1">
+                <a:prstTxWarp prst="textNoShape">
+                  <a:avLst/>
+                </a:prstTxWarp>
+              </a:bodyPr>
+              <a:lstStyle/>
+              <a:p>
+                <a:pPr marL="0" marR="0" lvl="0" indent="0" algn="ctr" defTabSz="914400" rtl="0" eaLnBrk="0" fontAlgn="base" latinLnBrk="0" hangingPunct="0">
+                  <a:lnSpc>
+                    <a:spcPct val="100000"/>
+                  </a:lnSpc>
+                  <a:spcBef>
+                    <a:spcPct val="0"/>
+                  </a:spcBef>
+                  <a:spcAft>
+                    <a:spcPct val="0"/>
+                  </a:spcAft>
+                  <a:buClrTx/>
+                  <a:buSzTx/>
+                  <a:buFontTx/>
+                  <a:buNone/>
+                  <a:tabLst/>
+                </a:pPr>
+                <a:r>
+                  <a:rPr kumimoji="0" lang="es-ES" altLang="en-US" sz="1100" b="0" i="0" u="none" strike="noStrike" cap="none" normalizeH="0" baseline="0">
+                    <a:ln>
+                      <a:noFill/>
+                    </a:ln>
+                    <a:solidFill>
+                      <a:schemeClr val="tx1"/>
+                    </a:solidFill>
+                    <a:effectLst/>
+                    <a:latin typeface="Calibri" panose="020F0502020204030204" pitchFamily="34" charset="0"/>
+                    <a:ea typeface="Calibri" panose="020F0502020204030204" pitchFamily="34" charset="0"/>
+                    <a:cs typeface="Times New Roman" panose="02020603050405020304" pitchFamily="18" charset="0"/>
+                  </a:rPr>
+                  <a:t>Tokenizer</a:t>
+                </a:r>
+                <a:endParaRPr kumimoji="0" lang="es-ES" altLang="en-US" sz="1800" b="0" i="0" u="none" strike="noStrike" cap="none" normalizeH="0" baseline="0">
                   <a:ln>
                     <a:noFill/>
                   </a:ln>
@@ -3933,85 +4769,85 @@
                     <a:schemeClr val="tx1"/>
                   </a:solidFill>
                   <a:effectLst/>
-                  <a:latin typeface="Calibri" panose="020F0502020204030204" pitchFamily="34" charset="0"/>
-                  <a:ea typeface="Calibri" panose="020F0502020204030204" pitchFamily="34" charset="0"/>
-                  <a:cs typeface="Times New Roman" panose="02020603050405020304" pitchFamily="18" charset="0"/>
-                </a:rPr>
-                <a:t>Infix-to-postfix translator</a:t>
-              </a:r>
-              <a:endParaRPr kumimoji="0" lang="es-ES" altLang="en-US" sz="1800" b="0" i="0" u="none" strike="noStrike" cap="none" normalizeH="0" baseline="0">
-                <a:ln>
-                  <a:noFill/>
-                </a:ln>
+                  <a:latin typeface="Arial" panose="020B0604020202020204" pitchFamily="34" charset="0"/>
+                </a:endParaRPr>
+              </a:p>
+            </p:txBody>
+          </p:sp>
+          <p:sp>
+            <p:nvSpPr>
+              <p:cNvPr id="5" name="Rectángulo 12">
+                <a:extLst>
+                  <a:ext uri="{FF2B5EF4-FFF2-40B4-BE49-F238E27FC236}">
+                    <a16:creationId xmlns:a16="http://schemas.microsoft.com/office/drawing/2014/main" id="{F4719394-54CF-4965-8F83-2B5136B91EF5}"/>
+                  </a:ext>
+                </a:extLst>
+              </p:cNvPr>
+              <p:cNvSpPr>
+                <a:spLocks noChangeArrowheads="1"/>
+              </p:cNvSpPr>
+              <p:nvPr/>
+            </p:nvSpPr>
+            <p:spPr bwMode="auto">
+              <a:xfrm>
+                <a:off x="7510303" y="1747044"/>
+                <a:ext cx="1339850" cy="800100"/>
+              </a:xfrm>
+              <a:prstGeom prst="rect">
+                <a:avLst/>
+              </a:prstGeom>
+              <a:solidFill>
+                <a:srgbClr val="4472C4"/>
+              </a:solidFill>
+              <a:ln w="12700">
                 <a:solidFill>
-                  <a:schemeClr val="tx1"/>
+                  <a:srgbClr val="1F3763"/>
                 </a:solidFill>
-                <a:effectLst/>
-                <a:latin typeface="Arial" panose="020B0604020202020204" pitchFamily="34" charset="0"/>
-              </a:endParaRPr>
-            </a:p>
-          </p:txBody>
-        </p:sp>
-        <p:sp>
-          <p:nvSpPr>
-            <p:cNvPr id="6" name="Rectángulo 13">
-              <a:extLst>
-                <a:ext uri="{FF2B5EF4-FFF2-40B4-BE49-F238E27FC236}">
-                  <a16:creationId xmlns:a16="http://schemas.microsoft.com/office/drawing/2014/main" id="{6703FF51-8C22-433E-A834-55A50BB2F463}"/>
-                </a:ext>
-              </a:extLst>
-            </p:cNvPr>
-            <p:cNvSpPr>
-              <a:spLocks noChangeArrowheads="1"/>
-            </p:cNvSpPr>
-            <p:nvPr/>
-          </p:nvSpPr>
-          <p:spPr bwMode="auto">
-            <a:xfrm>
-              <a:off x="7524590" y="3018631"/>
-              <a:ext cx="1325563" cy="808038"/>
-            </a:xfrm>
-            <a:prstGeom prst="rect">
-              <a:avLst/>
-            </a:prstGeom>
-            <a:solidFill>
-              <a:srgbClr val="4472C4"/>
-            </a:solidFill>
-            <a:ln w="12700">
-              <a:solidFill>
-                <a:srgbClr val="1F3763"/>
-              </a:solidFill>
-              <a:miter lim="800000"/>
-              <a:headEnd/>
-              <a:tailEnd/>
-            </a:ln>
-          </p:spPr>
-          <p:txBody>
-            <a:bodyPr vert="horz" wrap="square" lIns="91440" tIns="45720" rIns="91440" bIns="45720" numCol="1" anchor="ctr" anchorCtr="0" compatLnSpc="1">
-              <a:prstTxWarp prst="textNoShape">
-                <a:avLst/>
-              </a:prstTxWarp>
-            </a:bodyPr>
-            <a:lstStyle/>
-            <a:p>
-              <a:pPr marL="0" marR="0" lvl="0" indent="0" algn="ctr" defTabSz="914400" rtl="0" eaLnBrk="0" fontAlgn="base" latinLnBrk="0" hangingPunct="0">
-                <a:lnSpc>
-                  <a:spcPct val="100000"/>
-                </a:lnSpc>
-                <a:spcBef>
-                  <a:spcPct val="0"/>
-                </a:spcBef>
-                <a:spcAft>
-                  <a:spcPct val="0"/>
-                </a:spcAft>
-                <a:buClrTx/>
-                <a:buSzTx/>
-                <a:buFontTx/>
-                <a:buNone/>
-                <a:tabLst/>
-              </a:pPr>
-              <a:r>
-                <a:rPr kumimoji="0" lang="es-ES" altLang="en-US" sz="1100" b="0" i="0" u="none" strike="noStrike" cap="none" normalizeH="0" baseline="0">
+                <a:miter lim="800000"/>
+                <a:headEnd/>
+                <a:tailEnd/>
+              </a:ln>
+            </p:spPr>
+            <p:txBody>
+              <a:bodyPr vert="horz" wrap="square" lIns="91440" tIns="45720" rIns="91440" bIns="45720" numCol="1" anchor="ctr" anchorCtr="0" compatLnSpc="1">
+                <a:prstTxWarp prst="textNoShape">
+                  <a:avLst/>
+                </a:prstTxWarp>
+              </a:bodyPr>
+              <a:lstStyle/>
+              <a:p>
+                <a:pPr marL="0" marR="0" lvl="0" indent="0" algn="ctr" defTabSz="914400" rtl="0" eaLnBrk="0" fontAlgn="base" latinLnBrk="0" hangingPunct="0">
+                  <a:lnSpc>
+                    <a:spcPct val="100000"/>
+                  </a:lnSpc>
+                  <a:spcBef>
+                    <a:spcPct val="0"/>
+                  </a:spcBef>
+                  <a:spcAft>
+                    <a:spcPct val="0"/>
+                  </a:spcAft>
+                  <a:buClrTx/>
+                  <a:buSzTx/>
+                  <a:buFontTx/>
+                  <a:buNone/>
+                  <a:tabLst/>
+                </a:pPr>
+                <a:r>
+                  <a:rPr kumimoji="0" lang="es-ES" altLang="en-US" sz="1100" b="0" i="0" u="none" strike="noStrike" cap="none" normalizeH="0" baseline="0">
+                    <a:ln>
+                      <a:noFill/>
+                    </a:ln>
+                    <a:solidFill>
+                      <a:schemeClr val="tx1"/>
+                    </a:solidFill>
+                    <a:effectLst/>
+                    <a:latin typeface="Calibri" panose="020F0502020204030204" pitchFamily="34" charset="0"/>
+                    <a:ea typeface="Calibri" panose="020F0502020204030204" pitchFamily="34" charset="0"/>
+                    <a:cs typeface="Times New Roman" panose="02020603050405020304" pitchFamily="18" charset="0"/>
+                  </a:rPr>
+                  <a:t>Infix-to-postfix translator</a:t>
+                </a:r>
+                <a:endParaRPr kumimoji="0" lang="es-ES" altLang="en-US" sz="1800" b="0" i="0" u="none" strike="noStrike" cap="none" normalizeH="0" baseline="0">
                   <a:ln>
                     <a:noFill/>
                   </a:ln>
@@ -4019,85 +4855,85 @@
                     <a:schemeClr val="tx1"/>
                   </a:solidFill>
                   <a:effectLst/>
-                  <a:latin typeface="Calibri" panose="020F0502020204030204" pitchFamily="34" charset="0"/>
-                  <a:ea typeface="Calibri" panose="020F0502020204030204" pitchFamily="34" charset="0"/>
-                  <a:cs typeface="Times New Roman" panose="02020603050405020304" pitchFamily="18" charset="0"/>
-                </a:rPr>
-                <a:t>Code generator</a:t>
-              </a:r>
-              <a:endParaRPr kumimoji="0" lang="es-ES" altLang="en-US" sz="1800" b="0" i="0" u="none" strike="noStrike" cap="none" normalizeH="0" baseline="0">
-                <a:ln>
-                  <a:noFill/>
-                </a:ln>
+                  <a:latin typeface="Arial" panose="020B0604020202020204" pitchFamily="34" charset="0"/>
+                </a:endParaRPr>
+              </a:p>
+            </p:txBody>
+          </p:sp>
+          <p:sp>
+            <p:nvSpPr>
+              <p:cNvPr id="6" name="Rectángulo 13">
+                <a:extLst>
+                  <a:ext uri="{FF2B5EF4-FFF2-40B4-BE49-F238E27FC236}">
+                    <a16:creationId xmlns:a16="http://schemas.microsoft.com/office/drawing/2014/main" id="{6703FF51-8C22-433E-A834-55A50BB2F463}"/>
+                  </a:ext>
+                </a:extLst>
+              </p:cNvPr>
+              <p:cNvSpPr>
+                <a:spLocks noChangeArrowheads="1"/>
+              </p:cNvSpPr>
+              <p:nvPr/>
+            </p:nvSpPr>
+            <p:spPr bwMode="auto">
+              <a:xfrm>
+                <a:off x="7524590" y="3018631"/>
+                <a:ext cx="1325563" cy="808038"/>
+              </a:xfrm>
+              <a:prstGeom prst="rect">
+                <a:avLst/>
+              </a:prstGeom>
+              <a:solidFill>
+                <a:srgbClr val="4472C4"/>
+              </a:solidFill>
+              <a:ln w="12700">
                 <a:solidFill>
-                  <a:schemeClr val="tx1"/>
+                  <a:srgbClr val="1F3763"/>
                 </a:solidFill>
-                <a:effectLst/>
-                <a:latin typeface="Arial" panose="020B0604020202020204" pitchFamily="34" charset="0"/>
-              </a:endParaRPr>
-            </a:p>
-          </p:txBody>
-        </p:sp>
-        <p:sp>
-          <p:nvSpPr>
-            <p:cNvPr id="7" name="Rectángulo 14">
-              <a:extLst>
-                <a:ext uri="{FF2B5EF4-FFF2-40B4-BE49-F238E27FC236}">
-                  <a16:creationId xmlns:a16="http://schemas.microsoft.com/office/drawing/2014/main" id="{4F53EC02-FA39-4407-98CF-C292171E3D23}"/>
-                </a:ext>
-              </a:extLst>
-            </p:cNvPr>
-            <p:cNvSpPr>
-              <a:spLocks noChangeArrowheads="1"/>
-            </p:cNvSpPr>
-            <p:nvPr/>
-          </p:nvSpPr>
-          <p:spPr bwMode="auto">
-            <a:xfrm>
-              <a:off x="5418136" y="3018632"/>
-              <a:ext cx="1325564" cy="808038"/>
-            </a:xfrm>
-            <a:prstGeom prst="rect">
-              <a:avLst/>
-            </a:prstGeom>
-            <a:solidFill>
-              <a:srgbClr val="4472C4"/>
-            </a:solidFill>
-            <a:ln w="12700">
-              <a:solidFill>
-                <a:srgbClr val="1F3763"/>
-              </a:solidFill>
-              <a:miter lim="800000"/>
-              <a:headEnd/>
-              <a:tailEnd/>
-            </a:ln>
-          </p:spPr>
-          <p:txBody>
-            <a:bodyPr vert="horz" wrap="square" lIns="91440" tIns="45720" rIns="91440" bIns="45720" numCol="1" anchor="ctr" anchorCtr="0" compatLnSpc="1">
-              <a:prstTxWarp prst="textNoShape">
-                <a:avLst/>
-              </a:prstTxWarp>
-            </a:bodyPr>
-            <a:lstStyle/>
-            <a:p>
-              <a:pPr marL="0" marR="0" lvl="0" indent="0" algn="ctr" defTabSz="914400" rtl="0" eaLnBrk="0" fontAlgn="base" latinLnBrk="0" hangingPunct="0">
-                <a:lnSpc>
-                  <a:spcPct val="100000"/>
-                </a:lnSpc>
-                <a:spcBef>
-                  <a:spcPct val="0"/>
-                </a:spcBef>
-                <a:spcAft>
-                  <a:spcPct val="0"/>
-                </a:spcAft>
-                <a:buClrTx/>
-                <a:buSzTx/>
-                <a:buFontTx/>
-                <a:buNone/>
-                <a:tabLst/>
-              </a:pPr>
-              <a:r>
-                <a:rPr kumimoji="0" lang="es-ES" altLang="en-US" sz="1100" b="0" i="0" u="none" strike="noStrike" cap="none" normalizeH="0" baseline="0" dirty="0">
+                <a:miter lim="800000"/>
+                <a:headEnd/>
+                <a:tailEnd/>
+              </a:ln>
+            </p:spPr>
+            <p:txBody>
+              <a:bodyPr vert="horz" wrap="square" lIns="91440" tIns="45720" rIns="91440" bIns="45720" numCol="1" anchor="ctr" anchorCtr="0" compatLnSpc="1">
+                <a:prstTxWarp prst="textNoShape">
+                  <a:avLst/>
+                </a:prstTxWarp>
+              </a:bodyPr>
+              <a:lstStyle/>
+              <a:p>
+                <a:pPr marL="0" marR="0" lvl="0" indent="0" algn="ctr" defTabSz="914400" rtl="0" eaLnBrk="0" fontAlgn="base" latinLnBrk="0" hangingPunct="0">
+                  <a:lnSpc>
+                    <a:spcPct val="100000"/>
+                  </a:lnSpc>
+                  <a:spcBef>
+                    <a:spcPct val="0"/>
+                  </a:spcBef>
+                  <a:spcAft>
+                    <a:spcPct val="0"/>
+                  </a:spcAft>
+                  <a:buClrTx/>
+                  <a:buSzTx/>
+                  <a:buFontTx/>
+                  <a:buNone/>
+                  <a:tabLst/>
+                </a:pPr>
+                <a:r>
+                  <a:rPr kumimoji="0" lang="es-ES" altLang="en-US" sz="1100" b="0" i="0" u="none" strike="noStrike" cap="none" normalizeH="0" baseline="0">
+                    <a:ln>
+                      <a:noFill/>
+                    </a:ln>
+                    <a:solidFill>
+                      <a:schemeClr val="tx1"/>
+                    </a:solidFill>
+                    <a:effectLst/>
+                    <a:latin typeface="Calibri" panose="020F0502020204030204" pitchFamily="34" charset="0"/>
+                    <a:ea typeface="Calibri" panose="020F0502020204030204" pitchFamily="34" charset="0"/>
+                    <a:cs typeface="Times New Roman" panose="02020603050405020304" pitchFamily="18" charset="0"/>
+                  </a:rPr>
+                  <a:t>Code generator</a:t>
+                </a:r>
+                <a:endParaRPr kumimoji="0" lang="es-ES" altLang="en-US" sz="1800" b="0" i="0" u="none" strike="noStrike" cap="none" normalizeH="0" baseline="0">
                   <a:ln>
                     <a:noFill/>
                   </a:ln>
@@ -4105,44 +4941,343 @@
                     <a:schemeClr val="tx1"/>
                   </a:solidFill>
                   <a:effectLst/>
-                  <a:latin typeface="Calibri" panose="020F0502020204030204" pitchFamily="34" charset="0"/>
-                  <a:ea typeface="Calibri" panose="020F0502020204030204" pitchFamily="34" charset="0"/>
-                  <a:cs typeface="Times New Roman" panose="02020603050405020304" pitchFamily="18" charset="0"/>
-                </a:rPr>
-                <a:t>Virtual machine</a:t>
+                  <a:latin typeface="Arial" panose="020B0604020202020204" pitchFamily="34" charset="0"/>
+                </a:endParaRPr>
+              </a:p>
+            </p:txBody>
+          </p:sp>
+          <p:sp>
+            <p:nvSpPr>
+              <p:cNvPr id="7" name="Rectángulo 14">
+                <a:extLst>
+                  <a:ext uri="{FF2B5EF4-FFF2-40B4-BE49-F238E27FC236}">
+                    <a16:creationId xmlns:a16="http://schemas.microsoft.com/office/drawing/2014/main" id="{4F53EC02-FA39-4407-98CF-C292171E3D23}"/>
+                  </a:ext>
+                </a:extLst>
+              </p:cNvPr>
+              <p:cNvSpPr>
+                <a:spLocks noChangeArrowheads="1"/>
+              </p:cNvSpPr>
+              <p:nvPr/>
+            </p:nvSpPr>
+            <p:spPr bwMode="auto">
+              <a:xfrm>
+                <a:off x="5418136" y="3018632"/>
+                <a:ext cx="1325564" cy="808038"/>
+              </a:xfrm>
+              <a:prstGeom prst="rect">
+                <a:avLst/>
+              </a:prstGeom>
+              <a:solidFill>
+                <a:srgbClr val="4472C4"/>
+              </a:solidFill>
+              <a:ln w="12700">
+                <a:solidFill>
+                  <a:srgbClr val="1F3763"/>
+                </a:solidFill>
+                <a:miter lim="800000"/>
+                <a:headEnd/>
+                <a:tailEnd/>
+              </a:ln>
+            </p:spPr>
+            <p:txBody>
+              <a:bodyPr vert="horz" wrap="square" lIns="91440" tIns="45720" rIns="91440" bIns="45720" numCol="1" anchor="ctr" anchorCtr="0" compatLnSpc="1">
+                <a:prstTxWarp prst="textNoShape">
+                  <a:avLst/>
+                </a:prstTxWarp>
+              </a:bodyPr>
+              <a:lstStyle/>
+              <a:p>
+                <a:pPr marL="0" marR="0" lvl="0" indent="0" algn="ctr" defTabSz="914400" rtl="0" eaLnBrk="0" fontAlgn="base" latinLnBrk="0" hangingPunct="0">
+                  <a:lnSpc>
+                    <a:spcPct val="100000"/>
+                  </a:lnSpc>
+                  <a:spcBef>
+                    <a:spcPct val="0"/>
+                  </a:spcBef>
+                  <a:spcAft>
+                    <a:spcPct val="0"/>
+                  </a:spcAft>
+                  <a:buClrTx/>
+                  <a:buSzTx/>
+                  <a:buFontTx/>
+                  <a:buNone/>
+                  <a:tabLst/>
+                </a:pPr>
+                <a:r>
+                  <a:rPr kumimoji="0" lang="es-ES" altLang="en-US" sz="1100" b="0" i="0" u="none" strike="noStrike" cap="none" normalizeH="0" baseline="0" dirty="0">
+                    <a:ln>
+                      <a:noFill/>
+                    </a:ln>
+                    <a:solidFill>
+                      <a:schemeClr val="tx1"/>
+                    </a:solidFill>
+                    <a:effectLst/>
+                    <a:latin typeface="Calibri" panose="020F0502020204030204" pitchFamily="34" charset="0"/>
+                    <a:ea typeface="Calibri" panose="020F0502020204030204" pitchFamily="34" charset="0"/>
+                    <a:cs typeface="Times New Roman" panose="02020603050405020304" pitchFamily="18" charset="0"/>
+                  </a:rPr>
+                  <a:t>Virtual machine</a:t>
+                </a:r>
+                <a:endParaRPr kumimoji="0" lang="es-ES" altLang="en-US" sz="1800" b="0" i="0" u="none" strike="noStrike" cap="none" normalizeH="0" baseline="0" dirty="0">
+                  <a:ln>
+                    <a:noFill/>
+                  </a:ln>
+                  <a:solidFill>
+                    <a:schemeClr val="tx1"/>
+                  </a:solidFill>
+                  <a:effectLst/>
+                  <a:latin typeface="Arial" panose="020B0604020202020204" pitchFamily="34" charset="0"/>
+                </a:endParaRPr>
+              </a:p>
+            </p:txBody>
+          </p:sp>
+          <p:cxnSp>
+            <p:nvCxnSpPr>
+              <p:cNvPr id="14" name="Gerade Verbindung mit Pfeil 13">
+                <a:extLst>
+                  <a:ext uri="{FF2B5EF4-FFF2-40B4-BE49-F238E27FC236}">
+                    <a16:creationId xmlns:a16="http://schemas.microsoft.com/office/drawing/2014/main" id="{BD124F28-3CCB-42EB-950D-3D2BD2CF7859}"/>
+                  </a:ext>
+                </a:extLst>
+              </p:cNvPr>
+              <p:cNvCxnSpPr>
+                <a:stCxn id="4" idx="3"/>
+                <a:endCxn id="5" idx="1"/>
+              </p:cNvCxnSpPr>
+              <p:nvPr/>
+            </p:nvCxnSpPr>
+            <p:spPr>
+              <a:xfrm>
+                <a:off x="6743700" y="2147094"/>
+                <a:ext cx="766603" cy="0"/>
+              </a:xfrm>
+              <a:prstGeom prst="straightConnector1">
+                <a:avLst/>
+              </a:prstGeom>
+              <a:ln>
+                <a:tailEnd type="triangle"/>
+              </a:ln>
+            </p:spPr>
+            <p:style>
+              <a:lnRef idx="1">
+                <a:schemeClr val="accent1"/>
+              </a:lnRef>
+              <a:fillRef idx="0">
+                <a:schemeClr val="accent1"/>
+              </a:fillRef>
+              <a:effectRef idx="0">
+                <a:schemeClr val="accent1"/>
+              </a:effectRef>
+              <a:fontRef idx="minor">
+                <a:schemeClr val="tx1"/>
+              </a:fontRef>
+            </p:style>
+          </p:cxnSp>
+          <p:cxnSp>
+            <p:nvCxnSpPr>
+              <p:cNvPr id="16" name="Gerade Verbindung mit Pfeil 15">
+                <a:extLst>
+                  <a:ext uri="{FF2B5EF4-FFF2-40B4-BE49-F238E27FC236}">
+                    <a16:creationId xmlns:a16="http://schemas.microsoft.com/office/drawing/2014/main" id="{7ECF1A50-72F9-4271-A04B-6344BDD85A43}"/>
+                  </a:ext>
+                </a:extLst>
+              </p:cNvPr>
+              <p:cNvCxnSpPr>
+                <a:stCxn id="5" idx="2"/>
+                <a:endCxn id="6" idx="0"/>
+              </p:cNvCxnSpPr>
+              <p:nvPr/>
+            </p:nvCxnSpPr>
+            <p:spPr>
+              <a:xfrm>
+                <a:off x="8180228" y="2547144"/>
+                <a:ext cx="7144" cy="471487"/>
+              </a:xfrm>
+              <a:prstGeom prst="straightConnector1">
+                <a:avLst/>
+              </a:prstGeom>
+              <a:ln>
+                <a:tailEnd type="triangle"/>
+              </a:ln>
+            </p:spPr>
+            <p:style>
+              <a:lnRef idx="1">
+                <a:schemeClr val="accent1"/>
+              </a:lnRef>
+              <a:fillRef idx="0">
+                <a:schemeClr val="accent1"/>
+              </a:fillRef>
+              <a:effectRef idx="0">
+                <a:schemeClr val="accent1"/>
+              </a:effectRef>
+              <a:fontRef idx="minor">
+                <a:schemeClr val="tx1"/>
+              </a:fontRef>
+            </p:style>
+          </p:cxnSp>
+          <p:cxnSp>
+            <p:nvCxnSpPr>
+              <p:cNvPr id="18" name="Gerade Verbindung mit Pfeil 17">
+                <a:extLst>
+                  <a:ext uri="{FF2B5EF4-FFF2-40B4-BE49-F238E27FC236}">
+                    <a16:creationId xmlns:a16="http://schemas.microsoft.com/office/drawing/2014/main" id="{FCDA763C-1B82-447A-82F4-9BB727B6066D}"/>
+                  </a:ext>
+                </a:extLst>
+              </p:cNvPr>
+              <p:cNvCxnSpPr>
+                <a:stCxn id="6" idx="1"/>
+                <a:endCxn id="7" idx="3"/>
+              </p:cNvCxnSpPr>
+              <p:nvPr/>
+            </p:nvCxnSpPr>
+            <p:spPr>
+              <a:xfrm flipH="1">
+                <a:off x="6743700" y="3422650"/>
+                <a:ext cx="780890" cy="1"/>
+              </a:xfrm>
+              <a:prstGeom prst="straightConnector1">
+                <a:avLst/>
+              </a:prstGeom>
+              <a:ln>
+                <a:tailEnd type="triangle"/>
+              </a:ln>
+            </p:spPr>
+            <p:style>
+              <a:lnRef idx="1">
+                <a:schemeClr val="accent1"/>
+              </a:lnRef>
+              <a:fillRef idx="0">
+                <a:schemeClr val="accent1"/>
+              </a:fillRef>
+              <a:effectRef idx="0">
+                <a:schemeClr val="accent1"/>
+              </a:effectRef>
+              <a:fontRef idx="minor">
+                <a:schemeClr val="tx1"/>
+              </a:fontRef>
+            </p:style>
+          </p:cxnSp>
+        </p:grpSp>
+        <p:sp>
+          <p:nvSpPr>
+            <p:cNvPr id="2" name="Rechteck 1">
+              <a:extLst>
+                <a:ext uri="{FF2B5EF4-FFF2-40B4-BE49-F238E27FC236}">
+                  <a16:creationId xmlns:a16="http://schemas.microsoft.com/office/drawing/2014/main" id="{C9A40AA2-15F6-4C9E-A764-7812066D05B4}"/>
+                </a:ext>
+              </a:extLst>
+            </p:cNvPr>
+            <p:cNvSpPr/>
+            <p:nvPr/>
+          </p:nvSpPr>
+          <p:spPr>
+            <a:xfrm>
+              <a:off x="3065442" y="1572259"/>
+              <a:ext cx="1737360" cy="1472041"/>
+            </a:xfrm>
+            <a:prstGeom prst="rect">
+              <a:avLst/>
+            </a:prstGeom>
+          </p:spPr>
+          <p:style>
+            <a:lnRef idx="2">
+              <a:schemeClr val="accent1">
+                <a:shade val="50000"/>
+              </a:schemeClr>
+            </a:lnRef>
+            <a:fillRef idx="1">
+              <a:schemeClr val="accent1"/>
+            </a:fillRef>
+            <a:effectRef idx="0">
+              <a:schemeClr val="accent1"/>
+            </a:effectRef>
+            <a:fontRef idx="minor">
+              <a:schemeClr val="lt1"/>
+            </a:fontRef>
+          </p:style>
+          <p:txBody>
+            <a:bodyPr rtlCol="0" anchor="ctr"/>
+            <a:lstStyle/>
+            <a:p>
+              <a:pPr algn="ctr"/>
+              <a:r>
+                <a:rPr lang="de-DE" sz="1100" dirty="0"/>
+                <a:t>Inputfile</a:t>
               </a:r>
-              <a:endParaRPr kumimoji="0" lang="es-ES" altLang="en-US" sz="1800" b="0" i="0" u="none" strike="noStrike" cap="none" normalizeH="0" baseline="0" dirty="0">
-                <a:ln>
-                  <a:noFill/>
-                </a:ln>
-                <a:solidFill>
-                  <a:schemeClr val="tx1"/>
-                </a:solidFill>
-                <a:effectLst/>
-                <a:latin typeface="Arial" panose="020B0604020202020204" pitchFamily="34" charset="0"/>
-              </a:endParaRPr>
+              <a:endParaRPr lang="en-US" sz="1100" dirty="0"/>
+            </a:p>
+          </p:txBody>
+        </p:sp>
+        <p:sp>
+          <p:nvSpPr>
+            <p:cNvPr id="10" name="Rechteck: abgerundete Ecken 9">
+              <a:extLst>
+                <a:ext uri="{FF2B5EF4-FFF2-40B4-BE49-F238E27FC236}">
+                  <a16:creationId xmlns:a16="http://schemas.microsoft.com/office/drawing/2014/main" id="{8DD0E4F6-330A-4A6A-900D-28704116FD13}"/>
+                </a:ext>
+              </a:extLst>
+            </p:cNvPr>
+            <p:cNvSpPr/>
+            <p:nvPr/>
+          </p:nvSpPr>
+          <p:spPr>
+            <a:xfrm>
+              <a:off x="2896530" y="3585861"/>
+              <a:ext cx="2075183" cy="985514"/>
+            </a:xfrm>
+            <a:prstGeom prst="roundRect">
+              <a:avLst/>
+            </a:prstGeom>
+          </p:spPr>
+          <p:style>
+            <a:lnRef idx="2">
+              <a:schemeClr val="accent1">
+                <a:shade val="50000"/>
+              </a:schemeClr>
+            </a:lnRef>
+            <a:fillRef idx="1">
+              <a:schemeClr val="accent1"/>
+            </a:fillRef>
+            <a:effectRef idx="0">
+              <a:schemeClr val="accent1"/>
+            </a:effectRef>
+            <a:fontRef idx="minor">
+              <a:schemeClr val="lt1"/>
+            </a:fontRef>
+          </p:style>
+          <p:txBody>
+            <a:bodyPr rtlCol="0" anchor="ctr"/>
+            <a:lstStyle/>
+            <a:p>
+              <a:pPr algn="ctr"/>
+              <a:r>
+                <a:rPr lang="de-DE" sz="1100" dirty="0"/>
+                <a:t>User</a:t>
+              </a:r>
+              <a:endParaRPr lang="en-US" dirty="0"/>
             </a:p>
           </p:txBody>
         </p:sp>
         <p:cxnSp>
           <p:nvCxnSpPr>
-            <p:cNvPr id="14" name="Gerade Verbindung mit Pfeil 13">
+            <p:cNvPr id="17" name="Gerade Verbindung mit Pfeil 16">
               <a:extLst>
                 <a:ext uri="{FF2B5EF4-FFF2-40B4-BE49-F238E27FC236}">
-                  <a16:creationId xmlns:a16="http://schemas.microsoft.com/office/drawing/2014/main" id="{BD124F28-3CCB-42EB-950D-3D2BD2CF7859}"/>
+                  <a16:creationId xmlns:a16="http://schemas.microsoft.com/office/drawing/2014/main" id="{69C33B27-E710-4B12-9C61-A996A9EA06D7}"/>
                 </a:ext>
               </a:extLst>
             </p:cNvPr>
             <p:cNvCxnSpPr>
-              <a:stCxn id="4" idx="3"/>
-              <a:endCxn id="5" idx="1"/>
+              <a:stCxn id="2" idx="3"/>
+              <a:endCxn id="4" idx="1"/>
             </p:cNvCxnSpPr>
             <p:nvPr/>
           </p:nvCxnSpPr>
           <p:spPr>
             <a:xfrm>
-              <a:off x="6743700" y="2147094"/>
-              <a:ext cx="766603" cy="0"/>
+              <a:off x="4802802" y="2308280"/>
+              <a:ext cx="819251" cy="321574"/>
             </a:xfrm>
             <a:prstGeom prst="straightConnector1">
               <a:avLst/>
@@ -4168,23 +5303,23 @@
         </p:cxnSp>
         <p:cxnSp>
           <p:nvCxnSpPr>
-            <p:cNvPr id="16" name="Gerade Verbindung mit Pfeil 15">
+            <p:cNvPr id="22" name="Gerade Verbindung mit Pfeil 21">
               <a:extLst>
                 <a:ext uri="{FF2B5EF4-FFF2-40B4-BE49-F238E27FC236}">
-                  <a16:creationId xmlns:a16="http://schemas.microsoft.com/office/drawing/2014/main" id="{7ECF1A50-72F9-4271-A04B-6344BDD85A43}"/>
+                  <a16:creationId xmlns:a16="http://schemas.microsoft.com/office/drawing/2014/main" id="{54DDB2E4-F4D6-4E7E-AF91-831D9DA6112E}"/>
                 </a:ext>
               </a:extLst>
             </p:cNvPr>
             <p:cNvCxnSpPr>
-              <a:stCxn id="5" idx="2"/>
-              <a:endCxn id="6" idx="0"/>
+              <a:stCxn id="10" idx="0"/>
+              <a:endCxn id="2" idx="2"/>
             </p:cNvCxnSpPr>
             <p:nvPr/>
           </p:nvCxnSpPr>
           <p:spPr>
-            <a:xfrm>
-              <a:off x="8180228" y="2547144"/>
-              <a:ext cx="7144" cy="471487"/>
+            <a:xfrm flipV="1">
+              <a:off x="3934122" y="3044300"/>
+              <a:ext cx="0" cy="541561"/>
             </a:xfrm>
             <a:prstGeom prst="straightConnector1">
               <a:avLst/>
@@ -4208,25 +5343,79 @@
             </a:fontRef>
           </p:style>
         </p:cxnSp>
+        <p:sp>
+          <p:nvSpPr>
+            <p:cNvPr id="30" name="Rechteck: abgerundete Ecken 29">
+              <a:extLst>
+                <a:ext uri="{FF2B5EF4-FFF2-40B4-BE49-F238E27FC236}">
+                  <a16:creationId xmlns:a16="http://schemas.microsoft.com/office/drawing/2014/main" id="{7ED1FAC7-59E6-40E6-BC1C-7A38C10752EC}"/>
+                </a:ext>
+              </a:extLst>
+            </p:cNvPr>
+            <p:cNvSpPr/>
+            <p:nvPr/>
+          </p:nvSpPr>
+          <p:spPr>
+            <a:xfrm>
+              <a:off x="2997158" y="4770496"/>
+              <a:ext cx="1906271" cy="723101"/>
+            </a:xfrm>
+            <a:prstGeom prst="roundRect">
+              <a:avLst/>
+            </a:prstGeom>
+          </p:spPr>
+          <p:style>
+            <a:lnRef idx="2">
+              <a:schemeClr val="accent1">
+                <a:shade val="50000"/>
+              </a:schemeClr>
+            </a:lnRef>
+            <a:fillRef idx="1">
+              <a:schemeClr val="accent1"/>
+            </a:fillRef>
+            <a:effectRef idx="0">
+              <a:schemeClr val="accent1"/>
+            </a:effectRef>
+            <a:fontRef idx="minor">
+              <a:schemeClr val="lt1"/>
+            </a:fontRef>
+          </p:style>
+          <p:txBody>
+            <a:bodyPr rtlCol="0" anchor="ctr"/>
+            <a:lstStyle/>
+            <a:p>
+              <a:pPr algn="ctr"/>
+              <a:r>
+                <a:rPr lang="de-DE" sz="1100" dirty="0"/>
+                <a:t>Terminal </a:t>
+              </a:r>
+              <a:r>
+                <a:rPr lang="de-DE" sz="1100" dirty="0" err="1"/>
+                <a:t>output</a:t>
+              </a:r>
+              <a:endParaRPr lang="en-US" sz="1100" dirty="0"/>
+            </a:p>
+          </p:txBody>
+        </p:sp>
         <p:cxnSp>
           <p:nvCxnSpPr>
-            <p:cNvPr id="18" name="Gerade Verbindung mit Pfeil 17">
+            <p:cNvPr id="33" name="Gerade Verbindung mit Pfeil 32">
               <a:extLst>
                 <a:ext uri="{FF2B5EF4-FFF2-40B4-BE49-F238E27FC236}">
-                  <a16:creationId xmlns:a16="http://schemas.microsoft.com/office/drawing/2014/main" id="{FCDA763C-1B82-447A-82F4-9BB727B6066D}"/>
+                  <a16:creationId xmlns:a16="http://schemas.microsoft.com/office/drawing/2014/main" id="{FAC82DB2-999C-4A86-8C9D-E19209DF76C0}"/>
                 </a:ext>
               </a:extLst>
             </p:cNvPr>
             <p:cNvCxnSpPr>
-              <a:stCxn id="6" idx="1"/>
-              <a:endCxn id="7" idx="3"/>
+              <a:stCxn id="7" idx="1"/>
+              <a:endCxn id="30" idx="3"/>
             </p:cNvCxnSpPr>
             <p:nvPr/>
           </p:nvCxnSpPr>
           <p:spPr>
             <a:xfrm flipH="1">
-              <a:off x="6743700" y="3422650"/>
-              <a:ext cx="780890" cy="1"/>
+              <a:off x="4903429" y="4976657"/>
+              <a:ext cx="718622" cy="155390"/>
             </a:xfrm>
             <a:prstGeom prst="straightConnector1">
               <a:avLst/>

</xml_diff>